<commit_message>
hoping this is just the Power Point, let own this tomorrow!
</commit_message>
<xml_diff>
--- a/Project 1 presentation (1).pptx
+++ b/Project 1 presentation (1).pptx
@@ -5,31 +5,34 @@
     <p:sldMasterId id="2147483648" r:id="rId1"/>
   </p:sldMasterIdLst>
   <p:notesMasterIdLst>
-    <p:notesMasterId r:id="rId24"/>
+    <p:notesMasterId r:id="rId27"/>
   </p:notesMasterIdLst>
   <p:sldIdLst>
     <p:sldId id="256" r:id="rId2"/>
     <p:sldId id="258" r:id="rId3"/>
     <p:sldId id="271" r:id="rId4"/>
     <p:sldId id="272" r:id="rId5"/>
-    <p:sldId id="274" r:id="rId6"/>
-    <p:sldId id="273" r:id="rId7"/>
+    <p:sldId id="273" r:id="rId6"/>
+    <p:sldId id="274" r:id="rId7"/>
     <p:sldId id="278" r:id="rId8"/>
     <p:sldId id="265" r:id="rId9"/>
     <p:sldId id="275" r:id="rId10"/>
     <p:sldId id="276" r:id="rId11"/>
-    <p:sldId id="279" r:id="rId12"/>
-    <p:sldId id="277" r:id="rId13"/>
-    <p:sldId id="280" r:id="rId14"/>
-    <p:sldId id="263" r:id="rId15"/>
-    <p:sldId id="281" r:id="rId16"/>
-    <p:sldId id="266" r:id="rId17"/>
-    <p:sldId id="267" r:id="rId18"/>
-    <p:sldId id="268" r:id="rId19"/>
-    <p:sldId id="269" r:id="rId20"/>
-    <p:sldId id="270" r:id="rId21"/>
-    <p:sldId id="261" r:id="rId22"/>
-    <p:sldId id="262" r:id="rId23"/>
+    <p:sldId id="282" r:id="rId12"/>
+    <p:sldId id="279" r:id="rId13"/>
+    <p:sldId id="286" r:id="rId14"/>
+    <p:sldId id="280" r:id="rId15"/>
+    <p:sldId id="285" r:id="rId16"/>
+    <p:sldId id="283" r:id="rId17"/>
+    <p:sldId id="284" r:id="rId18"/>
+    <p:sldId id="261" r:id="rId19"/>
+    <p:sldId id="288" r:id="rId20"/>
+    <p:sldId id="287" r:id="rId21"/>
+    <p:sldId id="267" r:id="rId22"/>
+    <p:sldId id="268" r:id="rId23"/>
+    <p:sldId id="269" r:id="rId24"/>
+    <p:sldId id="262" r:id="rId25"/>
+    <p:sldId id="270" r:id="rId26"/>
   </p:sldIdLst>
   <p:sldSz cx="12192000" cy="6858000"/>
   <p:notesSz cx="6858000" cy="9144000"/>
@@ -230,7 +233,7 @@
           <a:p>
             <a:fld id="{F21BFEBA-444E-4D21-BCF8-C3853CB4E1DB}" type="datetimeFigureOut">
               <a:rPr lang="en-US" smtClean="0"/>
-              <a:t>2/3/2020</a:t>
+              <a:t>2/4/2020</a:t>
             </a:fld>
             <a:endParaRPr lang="en-US"/>
           </a:p>
@@ -679,33 +682,9 @@
           <a:bodyPr/>
           <a:lstStyle/>
           <a:p>
-            <a:pPr marL="171450" indent="-171450">
-              <a:buFont typeface="Arial" panose="020B0604020202020204" pitchFamily="34" charset="0"/>
-              <a:buChar char="•"/>
-            </a:pPr>
             <a:r>
               <a:rPr lang="en-US" dirty="0"/>
-              <a:t>We reach out to Multnomah County for Health inspection data</a:t>
-            </a:r>
-          </a:p>
-          <a:p>
-            <a:pPr marL="171450" indent="-171450">
-              <a:buFont typeface="Arial" panose="020B0604020202020204" pitchFamily="34" charset="0"/>
-              <a:buChar char="•"/>
-            </a:pPr>
-            <a:r>
-              <a:rPr lang="en-US" dirty="0"/>
-              <a:t>Got some info from the County via a CSV file</a:t>
-            </a:r>
-          </a:p>
-          <a:p>
-            <a:pPr marL="171450" indent="-171450">
-              <a:buFont typeface="Arial" panose="020B0604020202020204" pitchFamily="34" charset="0"/>
-              <a:buChar char="•"/>
-            </a:pPr>
-            <a:r>
-              <a:rPr lang="en-US" dirty="0"/>
-              <a:t>We found 4500 restaurants in Multnomah County</a:t>
+              <a:t>Call out the county was able to give a CSV file</a:t>
             </a:r>
           </a:p>
         </p:txBody>
@@ -727,7 +706,7 @@
           <a:p>
             <a:fld id="{C60EE7C2-D695-4AAA-9E42-80CCB42FD659}" type="slidenum">
               <a:rPr lang="en-US" smtClean="0"/>
-              <a:t>4</a:t>
+              <a:t>3</a:t>
             </a:fld>
             <a:endParaRPr lang="en-US"/>
           </a:p>
@@ -736,7 +715,7 @@
     </p:spTree>
     <p:extLst>
       <p:ext uri="{BB962C8B-B14F-4D97-AF65-F5344CB8AC3E}">
-        <p14:creationId xmlns:p14="http://schemas.microsoft.com/office/powerpoint/2010/main" val="2509551663"/>
+        <p14:creationId xmlns:p14="http://schemas.microsoft.com/office/powerpoint/2010/main" val="1264221738"/>
       </p:ext>
     </p:extLst>
   </p:cSld>
@@ -796,7 +775,7 @@
             </a:pPr>
             <a:r>
               <a:rPr lang="en-US" dirty="0"/>
-              <a:t>Started to use the physical address as a params in the Yelp API</a:t>
+              <a:t>We reach out to Multnomah County for Health inspection data</a:t>
             </a:r>
           </a:p>
           <a:p>
@@ -806,11 +785,18 @@
             </a:pPr>
             <a:r>
               <a:rPr lang="en-US" dirty="0"/>
-              <a:t>Found the name might be a better choice </a:t>
-            </a:r>
-          </a:p>
-          <a:p>
-            <a:endParaRPr lang="en-US" dirty="0"/>
+              <a:t>Got some info from the County via a CSV file</a:t>
+            </a:r>
+          </a:p>
+          <a:p>
+            <a:pPr marL="171450" indent="-171450">
+              <a:buFont typeface="Arial" panose="020B0604020202020204" pitchFamily="34" charset="0"/>
+              <a:buChar char="•"/>
+            </a:pPr>
+            <a:r>
+              <a:rPr lang="en-US" dirty="0"/>
+              <a:t>We found 4500 restaurants in Multnomah County</a:t>
+            </a:r>
           </a:p>
         </p:txBody>
       </p:sp>
@@ -831,7 +817,7 @@
           <a:p>
             <a:fld id="{C60EE7C2-D695-4AAA-9E42-80CCB42FD659}" type="slidenum">
               <a:rPr lang="en-US" smtClean="0"/>
-              <a:t>5</a:t>
+              <a:t>4</a:t>
             </a:fld>
             <a:endParaRPr lang="en-US"/>
           </a:p>
@@ -840,7 +826,7 @@
     </p:spTree>
     <p:extLst>
       <p:ext uri="{BB962C8B-B14F-4D97-AF65-F5344CB8AC3E}">
-        <p14:creationId xmlns:p14="http://schemas.microsoft.com/office/powerpoint/2010/main" val="3068576484"/>
+        <p14:creationId xmlns:p14="http://schemas.microsoft.com/office/powerpoint/2010/main" val="2509551663"/>
       </p:ext>
     </p:extLst>
   </p:cSld>
@@ -932,7 +918,7 @@
           <a:p>
             <a:fld id="{C60EE7C2-D695-4AAA-9E42-80CCB42FD659}" type="slidenum">
               <a:rPr lang="en-US" smtClean="0"/>
-              <a:t>6</a:t>
+              <a:t>5</a:t>
             </a:fld>
             <a:endParaRPr lang="en-US"/>
           </a:p>
@@ -1001,6 +987,110 @@
             </a:pPr>
             <a:r>
               <a:rPr lang="en-US" dirty="0"/>
+              <a:t>Started to use the physical address as a params in the Yelp API</a:t>
+            </a:r>
+          </a:p>
+          <a:p>
+            <a:pPr marL="171450" indent="-171450">
+              <a:buFont typeface="Arial" panose="020B0604020202020204" pitchFamily="34" charset="0"/>
+              <a:buChar char="•"/>
+            </a:pPr>
+            <a:r>
+              <a:rPr lang="en-US" dirty="0"/>
+              <a:t>Found the name might be a better choice </a:t>
+            </a:r>
+          </a:p>
+          <a:p>
+            <a:endParaRPr lang="en-US" dirty="0"/>
+          </a:p>
+        </p:txBody>
+      </p:sp>
+      <p:sp>
+        <p:nvSpPr>
+          <p:cNvPr id="4" name="Slide Number Placeholder 3"/>
+          <p:cNvSpPr>
+            <a:spLocks noGrp="1"/>
+          </p:cNvSpPr>
+          <p:nvPr>
+            <p:ph type="sldNum" sz="quarter" idx="5"/>
+          </p:nvPr>
+        </p:nvSpPr>
+        <p:spPr/>
+        <p:txBody>
+          <a:bodyPr/>
+          <a:lstStyle/>
+          <a:p>
+            <a:fld id="{C60EE7C2-D695-4AAA-9E42-80CCB42FD659}" type="slidenum">
+              <a:rPr lang="en-US" smtClean="0"/>
+              <a:t>6</a:t>
+            </a:fld>
+            <a:endParaRPr lang="en-US"/>
+          </a:p>
+        </p:txBody>
+      </p:sp>
+    </p:spTree>
+    <p:extLst>
+      <p:ext uri="{BB962C8B-B14F-4D97-AF65-F5344CB8AC3E}">
+        <p14:creationId xmlns:p14="http://schemas.microsoft.com/office/powerpoint/2010/main" val="3068576484"/>
+      </p:ext>
+    </p:extLst>
+  </p:cSld>
+  <p:clrMapOvr>
+    <a:masterClrMapping/>
+  </p:clrMapOvr>
+</p:notes>
+</file>
+
+<file path=ppt/notesSlides/notesSlide6.xml><?xml version="1.0" encoding="utf-8"?>
+<p:notes xmlns:a="http://schemas.openxmlformats.org/drawingml/2006/main" xmlns:r="http://schemas.openxmlformats.org/officeDocument/2006/relationships" xmlns:p="http://schemas.openxmlformats.org/presentationml/2006/main">
+  <p:cSld>
+    <p:spTree>
+      <p:nvGrpSpPr>
+        <p:cNvPr id="1" name=""/>
+        <p:cNvGrpSpPr/>
+        <p:nvPr/>
+      </p:nvGrpSpPr>
+      <p:grpSpPr>
+        <a:xfrm>
+          <a:off x="0" y="0"/>
+          <a:ext cx="0" cy="0"/>
+          <a:chOff x="0" y="0"/>
+          <a:chExt cx="0" cy="0"/>
+        </a:xfrm>
+      </p:grpSpPr>
+      <p:sp>
+        <p:nvSpPr>
+          <p:cNvPr id="2" name="Slide Image Placeholder 1"/>
+          <p:cNvSpPr>
+            <a:spLocks noGrp="1" noRot="1" noChangeAspect="1"/>
+          </p:cNvSpPr>
+          <p:nvPr>
+            <p:ph type="sldImg"/>
+          </p:nvPr>
+        </p:nvSpPr>
+        <p:spPr/>
+      </p:sp>
+      <p:sp>
+        <p:nvSpPr>
+          <p:cNvPr id="3" name="Notes Placeholder 2"/>
+          <p:cNvSpPr>
+            <a:spLocks noGrp="1"/>
+          </p:cNvSpPr>
+          <p:nvPr>
+            <p:ph type="body" idx="1"/>
+          </p:nvPr>
+        </p:nvSpPr>
+        <p:spPr/>
+        <p:txBody>
+          <a:bodyPr/>
+          <a:lstStyle/>
+          <a:p>
+            <a:pPr marL="171450" indent="-171450">
+              <a:buFont typeface="Arial" panose="020B0604020202020204" pitchFamily="34" charset="0"/>
+              <a:buChar char="•"/>
+            </a:pPr>
+            <a:r>
+              <a:rPr lang="en-US" dirty="0"/>
               <a:t>Our results worked</a:t>
             </a:r>
           </a:p>
@@ -1033,6 +1123,156 @@
     <p:extLst>
       <p:ext uri="{BB962C8B-B14F-4D97-AF65-F5344CB8AC3E}">
         <p14:creationId xmlns:p14="http://schemas.microsoft.com/office/powerpoint/2010/main" val="1922687629"/>
+      </p:ext>
+    </p:extLst>
+  </p:cSld>
+  <p:clrMapOvr>
+    <a:masterClrMapping/>
+  </p:clrMapOvr>
+</p:notes>
+</file>
+
+<file path=ppt/notesSlides/notesSlide7.xml><?xml version="1.0" encoding="utf-8"?>
+<p:notes xmlns:a="http://schemas.openxmlformats.org/drawingml/2006/main" xmlns:r="http://schemas.openxmlformats.org/officeDocument/2006/relationships" xmlns:p="http://schemas.openxmlformats.org/presentationml/2006/main">
+  <p:cSld>
+    <p:spTree>
+      <p:nvGrpSpPr>
+        <p:cNvPr id="1" name=""/>
+        <p:cNvGrpSpPr/>
+        <p:nvPr/>
+      </p:nvGrpSpPr>
+      <p:grpSpPr>
+        <a:xfrm>
+          <a:off x="0" y="0"/>
+          <a:ext cx="0" cy="0"/>
+          <a:chOff x="0" y="0"/>
+          <a:chExt cx="0" cy="0"/>
+        </a:xfrm>
+      </p:grpSpPr>
+      <p:sp>
+        <p:nvSpPr>
+          <p:cNvPr id="2" name="Slide Image Placeholder 1"/>
+          <p:cNvSpPr>
+            <a:spLocks noGrp="1" noRot="1" noChangeAspect="1"/>
+          </p:cNvSpPr>
+          <p:nvPr>
+            <p:ph type="sldImg"/>
+          </p:nvPr>
+        </p:nvSpPr>
+        <p:spPr/>
+      </p:sp>
+      <p:sp>
+        <p:nvSpPr>
+          <p:cNvPr id="3" name="Notes Placeholder 2"/>
+          <p:cNvSpPr>
+            <a:spLocks noGrp="1"/>
+          </p:cNvSpPr>
+          <p:nvPr>
+            <p:ph type="body" idx="1"/>
+          </p:nvPr>
+        </p:nvSpPr>
+        <p:spPr/>
+        <p:txBody>
+          <a:bodyPr/>
+          <a:lstStyle/>
+          <a:p>
+            <a:r>
+              <a:rPr lang="en-US" dirty="0"/>
+              <a:t>Found Data when we asked.</a:t>
+            </a:r>
+          </a:p>
+          <a:p>
+            <a:r>
+              <a:rPr lang="en-US" dirty="0"/>
+              <a:t>I think the team worked well together</a:t>
+            </a:r>
+          </a:p>
+          <a:p>
+            <a:r>
+              <a:rPr lang="en-US" dirty="0"/>
+              <a:t>Delegated strengths </a:t>
+            </a:r>
+          </a:p>
+          <a:p>
+            <a:endParaRPr lang="en-US" dirty="0"/>
+          </a:p>
+          <a:p>
+            <a:r>
+              <a:rPr lang="en-US" dirty="0"/>
+              <a:t>Our scope</a:t>
+            </a:r>
+          </a:p>
+          <a:p>
+            <a:r>
+              <a:rPr lang="en-US" dirty="0"/>
+              <a:t>Misunderstanding </a:t>
+            </a:r>
+          </a:p>
+          <a:p>
+            <a:r>
+              <a:rPr lang="en-US" dirty="0"/>
+              <a:t>Not as many expensive restaurants </a:t>
+            </a:r>
+          </a:p>
+          <a:p>
+            <a:endParaRPr lang="en-US" dirty="0"/>
+          </a:p>
+          <a:p>
+            <a:r>
+              <a:rPr lang="en-US" dirty="0"/>
+              <a:t>Git bash</a:t>
+            </a:r>
+          </a:p>
+          <a:p>
+            <a:r>
+              <a:rPr lang="en-US" dirty="0"/>
+              <a:t>Conflict errors</a:t>
+            </a:r>
+          </a:p>
+          <a:p>
+            <a:r>
+              <a:rPr lang="en-US" dirty="0"/>
+              <a:t>Understanding yelp API restrictions </a:t>
+            </a:r>
+          </a:p>
+          <a:p>
+            <a:endParaRPr lang="en-US" dirty="0"/>
+          </a:p>
+          <a:p>
+            <a:endParaRPr lang="en-US" dirty="0"/>
+          </a:p>
+          <a:p>
+            <a:endParaRPr lang="en-US" dirty="0"/>
+          </a:p>
+        </p:txBody>
+      </p:sp>
+      <p:sp>
+        <p:nvSpPr>
+          <p:cNvPr id="4" name="Slide Number Placeholder 3"/>
+          <p:cNvSpPr>
+            <a:spLocks noGrp="1"/>
+          </p:cNvSpPr>
+          <p:nvPr>
+            <p:ph type="sldNum" sz="quarter" idx="5"/>
+          </p:nvPr>
+        </p:nvSpPr>
+        <p:spPr/>
+        <p:txBody>
+          <a:bodyPr/>
+          <a:lstStyle/>
+          <a:p>
+            <a:fld id="{C60EE7C2-D695-4AAA-9E42-80CCB42FD659}" type="slidenum">
+              <a:rPr lang="en-US" smtClean="0"/>
+              <a:t>22</a:t>
+            </a:fld>
+            <a:endParaRPr lang="en-US"/>
+          </a:p>
+        </p:txBody>
+      </p:sp>
+    </p:spTree>
+    <p:extLst>
+      <p:ext uri="{BB962C8B-B14F-4D97-AF65-F5344CB8AC3E}">
+        <p14:creationId xmlns:p14="http://schemas.microsoft.com/office/powerpoint/2010/main" val="1295677208"/>
       </p:ext>
     </p:extLst>
   </p:cSld>
@@ -1189,7 +1429,7 @@
           <a:p>
             <a:fld id="{4112E8E4-3066-4D41-B9D9-DFF0E291FC3A}" type="datetimeFigureOut">
               <a:rPr lang="en-US" smtClean="0"/>
-              <a:t>2/3/2020</a:t>
+              <a:t>2/4/2020</a:t>
             </a:fld>
             <a:endParaRPr lang="en-US"/>
           </a:p>
@@ -1387,7 +1627,7 @@
           <a:p>
             <a:fld id="{4112E8E4-3066-4D41-B9D9-DFF0E291FC3A}" type="datetimeFigureOut">
               <a:rPr lang="en-US" smtClean="0"/>
-              <a:t>2/3/2020</a:t>
+              <a:t>2/4/2020</a:t>
             </a:fld>
             <a:endParaRPr lang="en-US"/>
           </a:p>
@@ -1595,7 +1835,7 @@
           <a:p>
             <a:fld id="{4112E8E4-3066-4D41-B9D9-DFF0E291FC3A}" type="datetimeFigureOut">
               <a:rPr lang="en-US" smtClean="0"/>
-              <a:t>2/3/2020</a:t>
+              <a:t>2/4/2020</a:t>
             </a:fld>
             <a:endParaRPr lang="en-US"/>
           </a:p>
@@ -1793,7 +2033,7 @@
           <a:p>
             <a:fld id="{4112E8E4-3066-4D41-B9D9-DFF0E291FC3A}" type="datetimeFigureOut">
               <a:rPr lang="en-US" smtClean="0"/>
-              <a:t>2/3/2020</a:t>
+              <a:t>2/4/2020</a:t>
             </a:fld>
             <a:endParaRPr lang="en-US"/>
           </a:p>
@@ -2068,7 +2308,7 @@
           <a:p>
             <a:fld id="{4112E8E4-3066-4D41-B9D9-DFF0E291FC3A}" type="datetimeFigureOut">
               <a:rPr lang="en-US" smtClean="0"/>
-              <a:t>2/3/2020</a:t>
+              <a:t>2/4/2020</a:t>
             </a:fld>
             <a:endParaRPr lang="en-US"/>
           </a:p>
@@ -2333,7 +2573,7 @@
           <a:p>
             <a:fld id="{4112E8E4-3066-4D41-B9D9-DFF0E291FC3A}" type="datetimeFigureOut">
               <a:rPr lang="en-US" smtClean="0"/>
-              <a:t>2/3/2020</a:t>
+              <a:t>2/4/2020</a:t>
             </a:fld>
             <a:endParaRPr lang="en-US"/>
           </a:p>
@@ -2745,7 +2985,7 @@
           <a:p>
             <a:fld id="{4112E8E4-3066-4D41-B9D9-DFF0E291FC3A}" type="datetimeFigureOut">
               <a:rPr lang="en-US" smtClean="0"/>
-              <a:t>2/3/2020</a:t>
+              <a:t>2/4/2020</a:t>
             </a:fld>
             <a:endParaRPr lang="en-US"/>
           </a:p>
@@ -2886,7 +3126,7 @@
           <a:p>
             <a:fld id="{4112E8E4-3066-4D41-B9D9-DFF0E291FC3A}" type="datetimeFigureOut">
               <a:rPr lang="en-US" smtClean="0"/>
-              <a:t>2/3/2020</a:t>
+              <a:t>2/4/2020</a:t>
             </a:fld>
             <a:endParaRPr lang="en-US"/>
           </a:p>
@@ -2999,7 +3239,7 @@
           <a:p>
             <a:fld id="{4112E8E4-3066-4D41-B9D9-DFF0E291FC3A}" type="datetimeFigureOut">
               <a:rPr lang="en-US" smtClean="0"/>
-              <a:t>2/3/2020</a:t>
+              <a:t>2/4/2020</a:t>
             </a:fld>
             <a:endParaRPr lang="en-US"/>
           </a:p>
@@ -3310,7 +3550,7 @@
           <a:p>
             <a:fld id="{4112E8E4-3066-4D41-B9D9-DFF0E291FC3A}" type="datetimeFigureOut">
               <a:rPr lang="en-US" smtClean="0"/>
-              <a:t>2/3/2020</a:t>
+              <a:t>2/4/2020</a:t>
             </a:fld>
             <a:endParaRPr lang="en-US"/>
           </a:p>
@@ -3598,7 +3838,7 @@
           <a:p>
             <a:fld id="{4112E8E4-3066-4D41-B9D9-DFF0E291FC3A}" type="datetimeFigureOut">
               <a:rPr lang="en-US" smtClean="0"/>
-              <a:t>2/3/2020</a:t>
+              <a:t>2/4/2020</a:t>
             </a:fld>
             <a:endParaRPr lang="en-US"/>
           </a:p>
@@ -3863,7 +4103,7 @@
           <a:p>
             <a:fld id="{4112E8E4-3066-4D41-B9D9-DFF0E291FC3A}" type="datetimeFigureOut">
               <a:rPr lang="en-US" smtClean="0"/>
-              <a:t>2/3/2020</a:t>
+              <a:t>2/4/2020</a:t>
             </a:fld>
             <a:endParaRPr lang="en-US"/>
           </a:p>
@@ -4303,9 +4543,10 @@
           </a:bodyPr>
           <a:lstStyle/>
           <a:p>
+            <a:pPr algn="l"/>
             <a:r>
               <a:rPr lang="en-US" dirty="0"/>
-              <a:t>Do more expensive restaurant have better health inspections scores?</a:t>
+              <a:t>Do more expensive restaurants have better health inspection scores?</a:t>
             </a:r>
           </a:p>
         </p:txBody>
@@ -4573,7 +4814,7 @@
           <p:cNvPr id="2" name="Title 1">
             <a:extLst>
               <a:ext uri="{FF2B5EF4-FFF2-40B4-BE49-F238E27FC236}">
-                <a16:creationId xmlns:a16="http://schemas.microsoft.com/office/drawing/2014/main" id="{98EBC9E1-C6DA-45E6-9197-A0476A5D97DA}"/>
+                <a16:creationId xmlns:a16="http://schemas.microsoft.com/office/drawing/2014/main" id="{3C819AED-B75A-44F1-BE8C-AD2352F02D12}"/>
               </a:ext>
             </a:extLst>
           </p:cNvPr>
@@ -4590,52 +4831,62 @@
           <a:lstStyle/>
           <a:p>
             <a:r>
-              <a:rPr lang="en-US"/>
-              <a:t>What was the first relationships we looked at?</a:t>
-            </a:r>
+              <a:rPr lang="en-US" dirty="0"/>
+              <a:t>We started to look at our results</a:t>
+            </a:r>
+          </a:p>
+        </p:txBody>
+      </p:sp>
+      <p:sp>
+        <p:nvSpPr>
+          <p:cNvPr id="3" name="Content Placeholder 2">
+            <a:extLst>
+              <a:ext uri="{FF2B5EF4-FFF2-40B4-BE49-F238E27FC236}">
+                <a16:creationId xmlns:a16="http://schemas.microsoft.com/office/drawing/2014/main" id="{018C9361-FEFC-42D6-9396-9CB46CF20534}"/>
+              </a:ext>
+            </a:extLst>
+          </p:cNvPr>
+          <p:cNvSpPr>
+            <a:spLocks noGrp="1"/>
+          </p:cNvSpPr>
+          <p:nvPr>
+            <p:ph idx="1"/>
+          </p:nvPr>
+        </p:nvSpPr>
+        <p:spPr/>
+        <p:txBody>
+          <a:bodyPr/>
+          <a:lstStyle/>
+          <a:p>
+            <a:r>
+              <a:rPr lang="en-US" dirty="0"/>
+              <a:t>Graphically</a:t>
+            </a:r>
+          </a:p>
+          <a:p>
             <a:endParaRPr lang="en-US" dirty="0"/>
           </a:p>
-        </p:txBody>
-      </p:sp>
-      <p:pic>
-        <p:nvPicPr>
-          <p:cNvPr id="5" name="Content Placeholder 4" descr="A close up of a logo&#10;&#10;Description automatically generated">
-            <a:extLst>
-              <a:ext uri="{FF2B5EF4-FFF2-40B4-BE49-F238E27FC236}">
-                <a16:creationId xmlns:a16="http://schemas.microsoft.com/office/drawing/2014/main" id="{AEE065D5-9F21-48D8-A98A-77FB9FB662F5}"/>
-              </a:ext>
-            </a:extLst>
-          </p:cNvPr>
-          <p:cNvPicPr>
-            <a:picLocks noGrp="1" noChangeAspect="1"/>
-          </p:cNvPicPr>
-          <p:nvPr>
-            <p:ph idx="1"/>
-          </p:nvPr>
-        </p:nvPicPr>
-        <p:blipFill>
-          <a:blip r:embed="rId2">
-            <a:extLst>
-              <a:ext uri="{28A0092B-C50C-407E-A947-70E740481C1C}">
-                <a14:useLocalDpi xmlns:a14="http://schemas.microsoft.com/office/drawing/2010/main" val="0"/>
-              </a:ext>
-            </a:extLst>
-          </a:blip>
-          <a:stretch>
-            <a:fillRect/>
-          </a:stretch>
-        </p:blipFill>
-        <p:spPr>
-          <a:xfrm>
-            <a:off x="2185696" y="1690688"/>
-            <a:ext cx="7820608" cy="5213738"/>
-          </a:xfrm>
-        </p:spPr>
-      </p:pic>
+          <a:p>
+            <a:r>
+              <a:rPr lang="en-US" dirty="0"/>
+              <a:t>Numerically </a:t>
+            </a:r>
+          </a:p>
+          <a:p>
+            <a:endParaRPr lang="en-US" dirty="0"/>
+          </a:p>
+          <a:p>
+            <a:r>
+              <a:rPr lang="en-US" dirty="0"/>
+              <a:t>Figuratively </a:t>
+            </a:r>
+          </a:p>
+        </p:txBody>
+      </p:sp>
     </p:spTree>
     <p:extLst>
       <p:ext uri="{BB962C8B-B14F-4D97-AF65-F5344CB8AC3E}">
-        <p14:creationId xmlns:p14="http://schemas.microsoft.com/office/powerpoint/2010/main" val="1698402330"/>
+        <p14:creationId xmlns:p14="http://schemas.microsoft.com/office/powerpoint/2010/main" val="3929069784"/>
       </p:ext>
     </p:extLst>
   </p:cSld>
@@ -4664,20 +4915,23 @@
       </p:grpSpPr>
       <p:pic>
         <p:nvPicPr>
-          <p:cNvPr id="3" name="Picture 2" descr="A screenshot of a cell phone&#10;&#10;Description automatically generated">
-            <a:extLst>
-              <a:ext uri="{FF2B5EF4-FFF2-40B4-BE49-F238E27FC236}">
-                <a16:creationId xmlns:a16="http://schemas.microsoft.com/office/drawing/2014/main" id="{F4E5672F-6412-493D-961B-EEB1EF79F833}"/>
+          <p:cNvPr id="5" name="Content Placeholder 4" descr="A close up of a logo&#10;&#10;Description automatically generated">
+            <a:extLst>
+              <a:ext uri="{FF2B5EF4-FFF2-40B4-BE49-F238E27FC236}">
+                <a16:creationId xmlns:a16="http://schemas.microsoft.com/office/drawing/2014/main" id="{AEE065D5-9F21-48D8-A98A-77FB9FB662F5}"/>
               </a:ext>
             </a:extLst>
           </p:cNvPr>
           <p:cNvPicPr>
-            <a:picLocks noChangeAspect="1"/>
+            <a:picLocks noGrp="1" noChangeAspect="1"/>
           </p:cNvPicPr>
-          <p:nvPr/>
+          <p:nvPr>
+            <p:ph idx="4294967295"/>
+          </p:nvPr>
         </p:nvPicPr>
         <p:blipFill>
           <a:blip r:embed="rId2">
+            <a:alphaModFix amt="93000"/>
             <a:extLst>
               <a:ext uri="{28A0092B-C50C-407E-A947-70E740481C1C}">
                 <a14:useLocalDpi xmlns:a14="http://schemas.microsoft.com/office/drawing/2010/main" val="0"/>
@@ -4690,18 +4944,15 @@
         </p:blipFill>
         <p:spPr>
           <a:xfrm>
-            <a:off x="1917699" y="643466"/>
-            <a:ext cx="8356601" cy="5571067"/>
+            <a:off x="1136780" y="122853"/>
+            <a:ext cx="9918440" cy="6612293"/>
           </a:xfrm>
-          <a:prstGeom prst="rect">
-            <a:avLst/>
-          </a:prstGeom>
         </p:spPr>
       </p:pic>
     </p:spTree>
     <p:extLst>
       <p:ext uri="{BB962C8B-B14F-4D97-AF65-F5344CB8AC3E}">
-        <p14:creationId xmlns:p14="http://schemas.microsoft.com/office/powerpoint/2010/main" val="2657828377"/>
+        <p14:creationId xmlns:p14="http://schemas.microsoft.com/office/powerpoint/2010/main" val="1698402330"/>
       </p:ext>
     </p:extLst>
   </p:cSld>
@@ -4730,6 +4981,68 @@
       </p:grpSpPr>
       <p:pic>
         <p:nvPicPr>
+          <p:cNvPr id="5" name="Picture 4">
+            <a:extLst>
+              <a:ext uri="{FF2B5EF4-FFF2-40B4-BE49-F238E27FC236}">
+                <a16:creationId xmlns:a16="http://schemas.microsoft.com/office/drawing/2014/main" id="{D17ABC99-D4DF-4F28-B68C-643879B60B27}"/>
+              </a:ext>
+            </a:extLst>
+          </p:cNvPr>
+          <p:cNvPicPr>
+            <a:picLocks noChangeAspect="1"/>
+          </p:cNvPicPr>
+          <p:nvPr/>
+        </p:nvPicPr>
+        <p:blipFill>
+          <a:blip r:embed="rId2">
+            <a:alphaModFix amt="93000"/>
+          </a:blip>
+          <a:stretch>
+            <a:fillRect/>
+          </a:stretch>
+        </p:blipFill>
+        <p:spPr>
+          <a:xfrm>
+            <a:off x="1438642" y="245259"/>
+            <a:ext cx="9314716" cy="6367482"/>
+          </a:xfrm>
+          <a:prstGeom prst="rect">
+            <a:avLst/>
+          </a:prstGeom>
+        </p:spPr>
+      </p:pic>
+    </p:spTree>
+    <p:extLst>
+      <p:ext uri="{BB962C8B-B14F-4D97-AF65-F5344CB8AC3E}">
+        <p14:creationId xmlns:p14="http://schemas.microsoft.com/office/powerpoint/2010/main" val="426986155"/>
+      </p:ext>
+    </p:extLst>
+  </p:cSld>
+  <p:clrMapOvr>
+    <a:masterClrMapping/>
+  </p:clrMapOvr>
+</p:sld>
+</file>
+
+<file path=ppt/slides/slide14.xml><?xml version="1.0" encoding="utf-8"?>
+<p:sld xmlns:a="http://schemas.openxmlformats.org/drawingml/2006/main" xmlns:r="http://schemas.openxmlformats.org/officeDocument/2006/relationships" xmlns:p="http://schemas.openxmlformats.org/presentationml/2006/main">
+  <p:cSld>
+    <p:spTree>
+      <p:nvGrpSpPr>
+        <p:cNvPr id="1" name=""/>
+        <p:cNvGrpSpPr/>
+        <p:nvPr/>
+      </p:nvGrpSpPr>
+      <p:grpSpPr>
+        <a:xfrm>
+          <a:off x="0" y="0"/>
+          <a:ext cx="0" cy="0"/>
+          <a:chOff x="0" y="0"/>
+          <a:chExt cx="0" cy="0"/>
+        </a:xfrm>
+      </p:grpSpPr>
+      <p:pic>
+        <p:nvPicPr>
           <p:cNvPr id="3" name="Picture 2" descr="A screenshot of a cell phone&#10;&#10;Description automatically generated">
             <a:extLst>
               <a:ext uri="{FF2B5EF4-FFF2-40B4-BE49-F238E27FC236}">
@@ -4849,93 +5162,6 @@
 </p:sld>
 </file>
 
-<file path=ppt/slides/slide14.xml><?xml version="1.0" encoding="utf-8"?>
-<p:sld xmlns:a="http://schemas.openxmlformats.org/drawingml/2006/main" xmlns:r="http://schemas.openxmlformats.org/officeDocument/2006/relationships" xmlns:p="http://schemas.openxmlformats.org/presentationml/2006/main">
-  <p:cSld>
-    <p:spTree>
-      <p:nvGrpSpPr>
-        <p:cNvPr id="1" name=""/>
-        <p:cNvGrpSpPr/>
-        <p:nvPr/>
-      </p:nvGrpSpPr>
-      <p:grpSpPr>
-        <a:xfrm>
-          <a:off x="0" y="0"/>
-          <a:ext cx="0" cy="0"/>
-          <a:chOff x="0" y="0"/>
-          <a:chExt cx="0" cy="0"/>
-        </a:xfrm>
-      </p:grpSpPr>
-      <p:sp>
-        <p:nvSpPr>
-          <p:cNvPr id="2" name="Title 1">
-            <a:extLst>
-              <a:ext uri="{FF2B5EF4-FFF2-40B4-BE49-F238E27FC236}">
-                <a16:creationId xmlns:a16="http://schemas.microsoft.com/office/drawing/2014/main" id="{CAC081E5-166A-4403-A27A-CC6CA48FCA93}"/>
-              </a:ext>
-            </a:extLst>
-          </p:cNvPr>
-          <p:cNvSpPr>
-            <a:spLocks noGrp="1"/>
-          </p:cNvSpPr>
-          <p:nvPr>
-            <p:ph type="title"/>
-          </p:nvPr>
-        </p:nvSpPr>
-        <p:spPr/>
-        <p:txBody>
-          <a:bodyPr/>
-          <a:lstStyle/>
-          <a:p>
-            <a:pPr algn="ctr"/>
-            <a:r>
-              <a:rPr lang="en-US" dirty="0"/>
-              <a:t>Did think that would happen</a:t>
-            </a:r>
-          </a:p>
-        </p:txBody>
-      </p:sp>
-      <p:sp>
-        <p:nvSpPr>
-          <p:cNvPr id="3" name="Content Placeholder 2">
-            <a:extLst>
-              <a:ext uri="{FF2B5EF4-FFF2-40B4-BE49-F238E27FC236}">
-                <a16:creationId xmlns:a16="http://schemas.microsoft.com/office/drawing/2014/main" id="{389693D1-BCE9-4209-AB82-111FFDBCB26D}"/>
-              </a:ext>
-            </a:extLst>
-          </p:cNvPr>
-          <p:cNvSpPr>
-            <a:spLocks noGrp="1"/>
-          </p:cNvSpPr>
-          <p:nvPr>
-            <p:ph idx="1"/>
-          </p:nvPr>
-        </p:nvSpPr>
-        <p:spPr/>
-        <p:txBody>
-          <a:bodyPr/>
-          <a:lstStyle/>
-          <a:p>
-            <a:r>
-              <a:rPr lang="en-US" dirty="0"/>
-              <a:t>any problems that arose after exploring the data, and how you resolved them</a:t>
-            </a:r>
-          </a:p>
-        </p:txBody>
-      </p:sp>
-    </p:spTree>
-    <p:extLst>
-      <p:ext uri="{BB962C8B-B14F-4D97-AF65-F5344CB8AC3E}">
-        <p14:creationId xmlns:p14="http://schemas.microsoft.com/office/powerpoint/2010/main" val="1156222978"/>
-      </p:ext>
-    </p:extLst>
-  </p:cSld>
-  <p:clrMapOvr>
-    <a:masterClrMapping/>
-  </p:clrMapOvr>
-</p:sld>
-</file>
-
 <file path=ppt/slides/slide15.xml><?xml version="1.0" encoding="utf-8"?>
 <p:sld xmlns:a="http://schemas.openxmlformats.org/drawingml/2006/main" xmlns:r="http://schemas.openxmlformats.org/officeDocument/2006/relationships" xmlns:p="http://schemas.openxmlformats.org/presentationml/2006/main">
   <p:cSld>
@@ -4953,10 +5179,47 @@
           <a:chExt cx="0" cy="0"/>
         </a:xfrm>
       </p:grpSpPr>
+      <p:pic>
+        <p:nvPicPr>
+          <p:cNvPr id="5" name="Picture 4" descr="A screenshot of a cell phone&#10;&#10;Description automatically generated">
+            <a:extLst>
+              <a:ext uri="{FF2B5EF4-FFF2-40B4-BE49-F238E27FC236}">
+                <a16:creationId xmlns:a16="http://schemas.microsoft.com/office/drawing/2014/main" id="{251513B4-5D55-46FE-B231-E57612D3C609}"/>
+              </a:ext>
+            </a:extLst>
+          </p:cNvPr>
+          <p:cNvPicPr>
+            <a:picLocks noChangeAspect="1"/>
+          </p:cNvPicPr>
+          <p:nvPr/>
+        </p:nvPicPr>
+        <p:blipFill>
+          <a:blip r:embed="rId2">
+            <a:alphaModFix amt="93000"/>
+            <a:extLst>
+              <a:ext uri="{28A0092B-C50C-407E-A947-70E740481C1C}">
+                <a14:useLocalDpi xmlns:a14="http://schemas.microsoft.com/office/drawing/2010/main" val="0"/>
+              </a:ext>
+            </a:extLst>
+          </a:blip>
+          <a:stretch>
+            <a:fillRect/>
+          </a:stretch>
+        </p:blipFill>
+        <p:spPr>
+          <a:xfrm>
+            <a:off x="1563198" y="407132"/>
+            <a:ext cx="9065603" cy="6043735"/>
+          </a:xfrm>
+          <a:prstGeom prst="rect">
+            <a:avLst/>
+          </a:prstGeom>
+        </p:spPr>
+      </p:pic>
     </p:spTree>
     <p:extLst>
       <p:ext uri="{BB962C8B-B14F-4D97-AF65-F5344CB8AC3E}">
-        <p14:creationId xmlns:p14="http://schemas.microsoft.com/office/powerpoint/2010/main" val="1395941257"/>
+        <p14:creationId xmlns:p14="http://schemas.microsoft.com/office/powerpoint/2010/main" val="3630701735"/>
       </p:ext>
     </p:extLst>
   </p:cSld>
@@ -4985,137 +5248,205 @@
       </p:grpSpPr>
       <p:sp>
         <p:nvSpPr>
-          <p:cNvPr id="2" name="Title 1">
-            <a:extLst>
-              <a:ext uri="{FF2B5EF4-FFF2-40B4-BE49-F238E27FC236}">
-                <a16:creationId xmlns:a16="http://schemas.microsoft.com/office/drawing/2014/main" id="{D759650F-4A31-4D48-93E3-037272A0DE21}"/>
-              </a:ext>
-            </a:extLst>
-          </p:cNvPr>
-          <p:cNvSpPr>
-            <a:spLocks noGrp="1"/>
-          </p:cNvSpPr>
-          <p:nvPr>
-            <p:ph type="title"/>
-          </p:nvPr>
-        </p:nvSpPr>
-        <p:spPr/>
-        <p:txBody>
-          <a:bodyPr/>
+          <p:cNvPr id="6" name="TextBox 5">
+            <a:extLst>
+              <a:ext uri="{FF2B5EF4-FFF2-40B4-BE49-F238E27FC236}">
+                <a16:creationId xmlns:a16="http://schemas.microsoft.com/office/drawing/2014/main" id="{A940A0ED-568F-4B06-AF6D-86F676E80BFC}"/>
+              </a:ext>
+            </a:extLst>
+          </p:cNvPr>
+          <p:cNvSpPr txBox="1"/>
+          <p:nvPr/>
+        </p:nvSpPr>
+        <p:spPr>
+          <a:xfrm>
+            <a:off x="881606" y="164854"/>
+            <a:ext cx="772358" cy="369332"/>
+          </a:xfrm>
+          <a:prstGeom prst="rect">
+            <a:avLst/>
+          </a:prstGeom>
+          <a:noFill/>
+        </p:spPr>
+        <p:txBody>
+          <a:bodyPr wrap="square" rtlCol="0">
+            <a:spAutoFit/>
+          </a:bodyPr>
           <a:lstStyle/>
           <a:p>
             <a:r>
               <a:rPr lang="en-US" dirty="0"/>
-              <a:t>When it was time to analyze the data</a:t>
-            </a:r>
-          </a:p>
-        </p:txBody>
-      </p:sp>
-      <p:sp>
-        <p:nvSpPr>
-          <p:cNvPr id="3" name="Content Placeholder 2">
-            <a:extLst>
-              <a:ext uri="{FF2B5EF4-FFF2-40B4-BE49-F238E27FC236}">
-                <a16:creationId xmlns:a16="http://schemas.microsoft.com/office/drawing/2014/main" id="{F9149705-1058-43F1-9BDE-1FD54A1C8FBC}"/>
-              </a:ext>
-            </a:extLst>
-          </p:cNvPr>
-          <p:cNvSpPr>
-            <a:spLocks noGrp="1"/>
-          </p:cNvSpPr>
-          <p:nvPr>
-            <p:ph idx="1"/>
-          </p:nvPr>
-        </p:nvSpPr>
-        <p:spPr/>
-        <p:txBody>
-          <a:bodyPr/>
+              <a:t>Cheap </a:t>
+            </a:r>
+          </a:p>
+        </p:txBody>
+      </p:sp>
+      <p:sp>
+        <p:nvSpPr>
+          <p:cNvPr id="7" name="TextBox 6">
+            <a:extLst>
+              <a:ext uri="{FF2B5EF4-FFF2-40B4-BE49-F238E27FC236}">
+                <a16:creationId xmlns:a16="http://schemas.microsoft.com/office/drawing/2014/main" id="{4B4A836F-DB04-4288-B0FE-6554304B4AB8}"/>
+              </a:ext>
+            </a:extLst>
+          </p:cNvPr>
+          <p:cNvSpPr txBox="1"/>
+          <p:nvPr/>
+        </p:nvSpPr>
+        <p:spPr>
+          <a:xfrm>
+            <a:off x="3610949" y="2329599"/>
+            <a:ext cx="578679" cy="369332"/>
+          </a:xfrm>
+          <a:prstGeom prst="rect">
+            <a:avLst/>
+          </a:prstGeom>
+          <a:noFill/>
+        </p:spPr>
+        <p:txBody>
+          <a:bodyPr wrap="square" rtlCol="0">
+            <a:spAutoFit/>
+          </a:bodyPr>
           <a:lstStyle/>
           <a:p>
             <a:r>
               <a:rPr lang="en-US" dirty="0"/>
-              <a:t>We found …</a:t>
-            </a:r>
-          </a:p>
-          <a:p>
-            <a:pPr lvl="1"/>
+              <a:t>Mid</a:t>
+            </a:r>
+          </a:p>
+        </p:txBody>
+      </p:sp>
+      <p:sp>
+        <p:nvSpPr>
+          <p:cNvPr id="8" name="TextBox 7">
+            <a:extLst>
+              <a:ext uri="{FF2B5EF4-FFF2-40B4-BE49-F238E27FC236}">
+                <a16:creationId xmlns:a16="http://schemas.microsoft.com/office/drawing/2014/main" id="{BCD17C6C-DF73-49EB-8AE4-00B7A81459C8}"/>
+              </a:ext>
+            </a:extLst>
+          </p:cNvPr>
+          <p:cNvSpPr txBox="1"/>
+          <p:nvPr/>
+        </p:nvSpPr>
+        <p:spPr>
+          <a:xfrm>
+            <a:off x="6096000" y="4553133"/>
+            <a:ext cx="1140764" cy="369332"/>
+          </a:xfrm>
+          <a:prstGeom prst="rect">
+            <a:avLst/>
+          </a:prstGeom>
+          <a:noFill/>
+        </p:spPr>
+        <p:txBody>
+          <a:bodyPr wrap="square" rtlCol="0">
+            <a:spAutoFit/>
+          </a:bodyPr>
+          <a:lstStyle/>
+          <a:p>
             <a:r>
               <a:rPr lang="en-US" dirty="0"/>
-              <a:t>Try to point to a part of our </a:t>
-            </a:r>
-            <a:r>
-              <a:rPr lang="en-US" dirty="0" err="1"/>
-              <a:t>jupyter</a:t>
-            </a:r>
-            <a:r>
-              <a:rPr lang="en-US" dirty="0"/>
-              <a:t> notebook</a:t>
-            </a:r>
-          </a:p>
-          <a:p>
-            <a:pPr lvl="2"/>
-            <a:r>
-              <a:rPr lang="en-US" dirty="0" err="1"/>
-              <a:t>jupyter</a:t>
-            </a:r>
-            <a:r>
-              <a:rPr lang="en-US" dirty="0"/>
-              <a:t> notebook reference </a:t>
-            </a:r>
-          </a:p>
-          <a:p>
-            <a:pPr lvl="2"/>
-            <a:endParaRPr lang="en-US" dirty="0"/>
-          </a:p>
-          <a:p>
-            <a:endParaRPr lang="en-US" dirty="0"/>
-          </a:p>
-          <a:p>
-            <a:r>
-              <a:rPr lang="en-US" dirty="0"/>
-              <a:t>We didn’t expect to find …</a:t>
-            </a:r>
-          </a:p>
-          <a:p>
-            <a:pPr lvl="1"/>
-            <a:r>
-              <a:rPr lang="en-US" dirty="0"/>
-              <a:t>Try to point to a part of our </a:t>
-            </a:r>
-            <a:r>
-              <a:rPr lang="en-US" dirty="0" err="1"/>
-              <a:t>jupyter</a:t>
-            </a:r>
-            <a:r>
-              <a:rPr lang="en-US" dirty="0"/>
-              <a:t> notebook</a:t>
-            </a:r>
-          </a:p>
-          <a:p>
-            <a:pPr lvl="2"/>
-            <a:r>
-              <a:rPr lang="en-US" dirty="0" err="1"/>
-              <a:t>jupyter</a:t>
-            </a:r>
-            <a:r>
-              <a:rPr lang="en-US" dirty="0"/>
-              <a:t> notebook reference </a:t>
-            </a:r>
-          </a:p>
-          <a:p>
-            <a:pPr lvl="2"/>
-            <a:endParaRPr lang="en-US" dirty="0"/>
-          </a:p>
-          <a:p>
-            <a:pPr lvl="1"/>
-            <a:endParaRPr lang="en-US" dirty="0"/>
-          </a:p>
-        </p:txBody>
-      </p:sp>
+              <a:t>Expensive</a:t>
+            </a:r>
+          </a:p>
+        </p:txBody>
+      </p:sp>
+      <p:pic>
+        <p:nvPicPr>
+          <p:cNvPr id="14" name="Picture 13">
+            <a:extLst>
+              <a:ext uri="{FF2B5EF4-FFF2-40B4-BE49-F238E27FC236}">
+                <a16:creationId xmlns:a16="http://schemas.microsoft.com/office/drawing/2014/main" id="{1C1C329D-551D-4674-A19C-4DB203240EF2}"/>
+              </a:ext>
+            </a:extLst>
+          </p:cNvPr>
+          <p:cNvPicPr>
+            <a:picLocks noChangeAspect="1"/>
+          </p:cNvPicPr>
+          <p:nvPr/>
+        </p:nvPicPr>
+        <p:blipFill>
+          <a:blip r:embed="rId2"/>
+          <a:stretch>
+            <a:fillRect/>
+          </a:stretch>
+        </p:blipFill>
+        <p:spPr>
+          <a:xfrm>
+            <a:off x="1792074" y="2671232"/>
+            <a:ext cx="6210300" cy="1847850"/>
+          </a:xfrm>
+          <a:prstGeom prst="rect">
+            <a:avLst/>
+          </a:prstGeom>
+        </p:spPr>
+      </p:pic>
+      <p:pic>
+        <p:nvPicPr>
+          <p:cNvPr id="15" name="Picture 14">
+            <a:extLst>
+              <a:ext uri="{FF2B5EF4-FFF2-40B4-BE49-F238E27FC236}">
+                <a16:creationId xmlns:a16="http://schemas.microsoft.com/office/drawing/2014/main" id="{F161C24D-0B0E-4E67-B939-6B869D02A5A1}"/>
+              </a:ext>
+            </a:extLst>
+          </p:cNvPr>
+          <p:cNvPicPr>
+            <a:picLocks noChangeAspect="1"/>
+          </p:cNvPicPr>
+          <p:nvPr/>
+        </p:nvPicPr>
+        <p:blipFill>
+          <a:blip r:embed="rId3"/>
+          <a:stretch>
+            <a:fillRect/>
+          </a:stretch>
+        </p:blipFill>
+        <p:spPr>
+          <a:xfrm>
+            <a:off x="360832" y="481749"/>
+            <a:ext cx="6305550" cy="1847850"/>
+          </a:xfrm>
+          <a:prstGeom prst="rect">
+            <a:avLst/>
+          </a:prstGeom>
+        </p:spPr>
+      </p:pic>
+      <p:pic>
+        <p:nvPicPr>
+          <p:cNvPr id="16" name="Picture 15">
+            <a:extLst>
+              <a:ext uri="{FF2B5EF4-FFF2-40B4-BE49-F238E27FC236}">
+                <a16:creationId xmlns:a16="http://schemas.microsoft.com/office/drawing/2014/main" id="{F4D10408-0F0D-4759-A56E-3F3B2DDDD511}"/>
+              </a:ext>
+            </a:extLst>
+          </p:cNvPr>
+          <p:cNvPicPr>
+            <a:picLocks noChangeAspect="1"/>
+          </p:cNvPicPr>
+          <p:nvPr/>
+        </p:nvPicPr>
+        <p:blipFill>
+          <a:blip r:embed="rId4">
+            <a:alphaModFix amt="93000"/>
+          </a:blip>
+          <a:stretch>
+            <a:fillRect/>
+          </a:stretch>
+        </p:blipFill>
+        <p:spPr>
+          <a:xfrm>
+            <a:off x="5384541" y="4922465"/>
+            <a:ext cx="6629400" cy="1847850"/>
+          </a:xfrm>
+          <a:prstGeom prst="rect">
+            <a:avLst/>
+          </a:prstGeom>
+        </p:spPr>
+      </p:pic>
     </p:spTree>
     <p:extLst>
       <p:ext uri="{BB962C8B-B14F-4D97-AF65-F5344CB8AC3E}">
-        <p14:creationId xmlns:p14="http://schemas.microsoft.com/office/powerpoint/2010/main" val="1787629135"/>
+        <p14:creationId xmlns:p14="http://schemas.microsoft.com/office/powerpoint/2010/main" val="1930405673"/>
       </p:ext>
     </p:extLst>
   </p:cSld>
@@ -5144,10 +5475,47 @@
       </p:grpSpPr>
       <p:sp>
         <p:nvSpPr>
-          <p:cNvPr id="2" name="Title 1">
-            <a:extLst>
-              <a:ext uri="{FF2B5EF4-FFF2-40B4-BE49-F238E27FC236}">
-                <a16:creationId xmlns:a16="http://schemas.microsoft.com/office/drawing/2014/main" id="{D0B1C1E6-F0EC-495A-9CD4-93351601C446}"/>
+          <p:cNvPr id="3" name="Rectangle 2">
+            <a:extLst>
+              <a:ext uri="{FF2B5EF4-FFF2-40B4-BE49-F238E27FC236}">
+                <a16:creationId xmlns:a16="http://schemas.microsoft.com/office/drawing/2014/main" id="{8853AE1B-30B2-4CBB-A2FD-410A9C6D8B68}"/>
+              </a:ext>
+            </a:extLst>
+          </p:cNvPr>
+          <p:cNvSpPr/>
+          <p:nvPr/>
+        </p:nvSpPr>
+        <p:spPr>
+          <a:xfrm>
+            <a:off x="3048000" y="3105835"/>
+            <a:ext cx="6096000" cy="646331"/>
+          </a:xfrm>
+          <a:prstGeom prst="rect">
+            <a:avLst/>
+          </a:prstGeom>
+        </p:spPr>
+        <p:txBody>
+          <a:bodyPr>
+            <a:spAutoFit/>
+          </a:bodyPr>
+          <a:lstStyle/>
+          <a:p>
+            <a:r>
+              <a:rPr lang="en-US" dirty="0">
+                <a:hlinkClick r:id="rId2"/>
+              </a:rPr>
+              <a:t>https://github.com/DCMilligan88/Project1Repo/blob/nancybranch/analysis_project1.ipynb</a:t>
+            </a:r>
+            <a:endParaRPr lang="en-US" dirty="0"/>
+          </a:p>
+        </p:txBody>
+      </p:sp>
+      <p:sp>
+        <p:nvSpPr>
+          <p:cNvPr id="4" name="Title 3">
+            <a:extLst>
+              <a:ext uri="{FF2B5EF4-FFF2-40B4-BE49-F238E27FC236}">
+                <a16:creationId xmlns:a16="http://schemas.microsoft.com/office/drawing/2014/main" id="{35155F68-64BF-4917-BC21-271CC026169A}"/>
               </a:ext>
             </a:extLst>
           </p:cNvPr>
@@ -5165,64 +5533,7 @@
           <a:p>
             <a:r>
               <a:rPr lang="en-US" dirty="0"/>
-              <a:t>Why we are right if we are?</a:t>
-            </a:r>
-          </a:p>
-        </p:txBody>
-      </p:sp>
-      <p:sp>
-        <p:nvSpPr>
-          <p:cNvPr id="3" name="Content Placeholder 2">
-            <a:extLst>
-              <a:ext uri="{FF2B5EF4-FFF2-40B4-BE49-F238E27FC236}">
-                <a16:creationId xmlns:a16="http://schemas.microsoft.com/office/drawing/2014/main" id="{7C58205A-18BD-4DD1-926B-646A04B076EB}"/>
-              </a:ext>
-            </a:extLst>
-          </p:cNvPr>
-          <p:cNvSpPr>
-            <a:spLocks noGrp="1"/>
-          </p:cNvSpPr>
-          <p:nvPr>
-            <p:ph idx="1"/>
-          </p:nvPr>
-        </p:nvSpPr>
-        <p:spPr/>
-        <p:txBody>
-          <a:bodyPr>
-            <a:normAutofit fontScale="92500" lnSpcReduction="10000"/>
-          </a:bodyPr>
-          <a:lstStyle/>
-          <a:p>
-            <a:r>
-              <a:rPr lang="en-US" dirty="0"/>
-              <a:t>Our assumption was the more expensive a restaurant is the better the health score.</a:t>
-            </a:r>
-          </a:p>
-          <a:p>
-            <a:endParaRPr lang="en-US" dirty="0"/>
-          </a:p>
-          <a:p>
-            <a:r>
-              <a:rPr lang="en-US" dirty="0"/>
-              <a:t>What we found was (X) of business with an expensive rating scored (X%) on a health inspection</a:t>
-            </a:r>
-          </a:p>
-          <a:p>
-            <a:endParaRPr lang="en-US" dirty="0"/>
-          </a:p>
-          <a:p>
-            <a:r>
-              <a:rPr lang="en-US" dirty="0"/>
-              <a:t>We found that (X) business with less expensive rating scored (X%) on a health inspection</a:t>
-            </a:r>
-          </a:p>
-          <a:p>
-            <a:endParaRPr lang="en-US" dirty="0"/>
-          </a:p>
-          <a:p>
-            <a:r>
-              <a:rPr lang="en-US" dirty="0"/>
-              <a:t>We found that (X) business with an average expense rate scored (X%) on a health inspection </a:t>
+              <a:t>What it looked like</a:t>
             </a:r>
           </a:p>
         </p:txBody>
@@ -5230,7 +5541,7 @@
     </p:spTree>
     <p:extLst>
       <p:ext uri="{BB962C8B-B14F-4D97-AF65-F5344CB8AC3E}">
-        <p14:creationId xmlns:p14="http://schemas.microsoft.com/office/powerpoint/2010/main" val="3958127287"/>
+        <p14:creationId xmlns:p14="http://schemas.microsoft.com/office/powerpoint/2010/main" val="974594137"/>
       </p:ext>
     </p:extLst>
   </p:cSld>
@@ -5262,7 +5573,7 @@
           <p:cNvPr id="2" name="Title 1">
             <a:extLst>
               <a:ext uri="{FF2B5EF4-FFF2-40B4-BE49-F238E27FC236}">
-                <a16:creationId xmlns:a16="http://schemas.microsoft.com/office/drawing/2014/main" id="{A2717ECB-5E16-4022-857C-6CEAE49538DD}"/>
+                <a16:creationId xmlns:a16="http://schemas.microsoft.com/office/drawing/2014/main" id="{376566FC-C8EA-4093-B6C8-D8CE94856BA9}"/>
               </a:ext>
             </a:extLst>
           </p:cNvPr>
@@ -5280,67 +5591,194 @@
           <a:p>
             <a:r>
               <a:rPr lang="en-US" dirty="0"/>
-              <a:t>Memories </a:t>
-            </a:r>
-          </a:p>
-        </p:txBody>
-      </p:sp>
-      <p:sp>
-        <p:nvSpPr>
-          <p:cNvPr id="3" name="Content Placeholder 2">
-            <a:extLst>
-              <a:ext uri="{FF2B5EF4-FFF2-40B4-BE49-F238E27FC236}">
-                <a16:creationId xmlns:a16="http://schemas.microsoft.com/office/drawing/2014/main" id="{4C08FD03-AB9D-4B90-BDFF-D05313DD5511}"/>
-              </a:ext>
-            </a:extLst>
-          </p:cNvPr>
-          <p:cNvSpPr>
-            <a:spLocks noGrp="1"/>
-          </p:cNvSpPr>
+              <a:t>Didn’t think that would happen?</a:t>
+            </a:r>
+          </a:p>
+        </p:txBody>
+      </p:sp>
+      <p:pic>
+        <p:nvPicPr>
+          <p:cNvPr id="5" name="Content Placeholder 4" descr="A screenshot of a cell phone&#10;&#10;Description automatically generated">
+            <a:extLst>
+              <a:ext uri="{FF2B5EF4-FFF2-40B4-BE49-F238E27FC236}">
+                <a16:creationId xmlns:a16="http://schemas.microsoft.com/office/drawing/2014/main" id="{18BEA69E-B828-40C2-AFBD-89925F84826F}"/>
+              </a:ext>
+            </a:extLst>
+          </p:cNvPr>
+          <p:cNvPicPr>
+            <a:picLocks noGrp="1" noChangeAspect="1"/>
+          </p:cNvPicPr>
           <p:nvPr>
             <p:ph idx="1"/>
           </p:nvPr>
-        </p:nvSpPr>
-        <p:spPr/>
-        <p:txBody>
-          <a:bodyPr/>
-          <a:lstStyle/>
-          <a:p>
-            <a:r>
-              <a:rPr lang="en-US" dirty="0"/>
-              <a:t>Things that went really well</a:t>
-            </a:r>
-          </a:p>
-          <a:p>
-            <a:r>
-              <a:rPr lang="en-US" dirty="0"/>
-              <a:t>Things that well</a:t>
-            </a:r>
-          </a:p>
-          <a:p>
-            <a:r>
-              <a:rPr lang="en-US" dirty="0"/>
-              <a:t>Things that did what they did</a:t>
-            </a:r>
-          </a:p>
-          <a:p>
-            <a:r>
-              <a:rPr lang="en-US" dirty="0"/>
-              <a:t>Things that became a pain</a:t>
-            </a:r>
-          </a:p>
-          <a:p>
-            <a:r>
-              <a:rPr lang="en-US" dirty="0"/>
-              <a:t>Things that sucked</a:t>
-            </a:r>
-          </a:p>
-        </p:txBody>
-      </p:sp>
+        </p:nvPicPr>
+        <p:blipFill>
+          <a:blip r:embed="rId2">
+            <a:extLst>
+              <a:ext uri="{28A0092B-C50C-407E-A947-70E740481C1C}">
+                <a14:useLocalDpi xmlns:a14="http://schemas.microsoft.com/office/drawing/2010/main" val="0"/>
+              </a:ext>
+            </a:extLst>
+          </a:blip>
+          <a:stretch>
+            <a:fillRect/>
+          </a:stretch>
+        </p:blipFill>
+        <p:spPr>
+          <a:xfrm>
+            <a:off x="27043" y="1308755"/>
+            <a:ext cx="4656938" cy="3104625"/>
+          </a:xfrm>
+        </p:spPr>
+      </p:pic>
+      <p:pic>
+        <p:nvPicPr>
+          <p:cNvPr id="7" name="Picture 6" descr="A screenshot of a cell phone&#10;&#10;Description automatically generated">
+            <a:extLst>
+              <a:ext uri="{FF2B5EF4-FFF2-40B4-BE49-F238E27FC236}">
+                <a16:creationId xmlns:a16="http://schemas.microsoft.com/office/drawing/2014/main" id="{2ED177B3-9145-4F2F-AD5F-ACA4D52F0C7A}"/>
+              </a:ext>
+            </a:extLst>
+          </p:cNvPr>
+          <p:cNvPicPr>
+            <a:picLocks noChangeAspect="1"/>
+          </p:cNvPicPr>
+          <p:nvPr/>
+        </p:nvPicPr>
+        <p:blipFill>
+          <a:blip r:embed="rId3">
+            <a:extLst>
+              <a:ext uri="{28A0092B-C50C-407E-A947-70E740481C1C}">
+                <a14:useLocalDpi xmlns:a14="http://schemas.microsoft.com/office/drawing/2010/main" val="0"/>
+              </a:ext>
+            </a:extLst>
+          </a:blip>
+          <a:stretch>
+            <a:fillRect/>
+          </a:stretch>
+        </p:blipFill>
+        <p:spPr>
+          <a:xfrm>
+            <a:off x="1283003" y="4610222"/>
+            <a:ext cx="2823980" cy="1882653"/>
+          </a:xfrm>
+          <a:prstGeom prst="rect">
+            <a:avLst/>
+          </a:prstGeom>
+        </p:spPr>
+      </p:pic>
+      <p:pic>
+        <p:nvPicPr>
+          <p:cNvPr id="9" name="Picture 8" descr="A screenshot of a cell phone&#10;&#10;Description automatically generated">
+            <a:extLst>
+              <a:ext uri="{FF2B5EF4-FFF2-40B4-BE49-F238E27FC236}">
+                <a16:creationId xmlns:a16="http://schemas.microsoft.com/office/drawing/2014/main" id="{9F38D004-BEEC-41B9-A09F-1FE7EE14451C}"/>
+              </a:ext>
+            </a:extLst>
+          </p:cNvPr>
+          <p:cNvPicPr>
+            <a:picLocks noChangeAspect="1"/>
+          </p:cNvPicPr>
+          <p:nvPr/>
+        </p:nvPicPr>
+        <p:blipFill>
+          <a:blip r:embed="rId4">
+            <a:extLst>
+              <a:ext uri="{28A0092B-C50C-407E-A947-70E740481C1C}">
+                <a14:useLocalDpi xmlns:a14="http://schemas.microsoft.com/office/drawing/2010/main" val="0"/>
+              </a:ext>
+            </a:extLst>
+          </a:blip>
+          <a:stretch>
+            <a:fillRect/>
+          </a:stretch>
+        </p:blipFill>
+        <p:spPr>
+          <a:xfrm>
+            <a:off x="4389053" y="3330903"/>
+            <a:ext cx="3039161" cy="2026107"/>
+          </a:xfrm>
+          <a:prstGeom prst="rect">
+            <a:avLst/>
+          </a:prstGeom>
+        </p:spPr>
+      </p:pic>
+      <p:pic>
+        <p:nvPicPr>
+          <p:cNvPr id="11" name="Picture 10" descr="A screenshot of a cell phone&#10;&#10;Description automatically generated">
+            <a:extLst>
+              <a:ext uri="{FF2B5EF4-FFF2-40B4-BE49-F238E27FC236}">
+                <a16:creationId xmlns:a16="http://schemas.microsoft.com/office/drawing/2014/main" id="{E36CE1E1-4847-46F1-BB19-FA2ADD28139B}"/>
+              </a:ext>
+            </a:extLst>
+          </p:cNvPr>
+          <p:cNvPicPr>
+            <a:picLocks noChangeAspect="1"/>
+          </p:cNvPicPr>
+          <p:nvPr/>
+        </p:nvPicPr>
+        <p:blipFill>
+          <a:blip r:embed="rId5">
+            <a:extLst>
+              <a:ext uri="{28A0092B-C50C-407E-A947-70E740481C1C}">
+                <a14:useLocalDpi xmlns:a14="http://schemas.microsoft.com/office/drawing/2010/main" val="0"/>
+              </a:ext>
+            </a:extLst>
+          </a:blip>
+          <a:stretch>
+            <a:fillRect/>
+          </a:stretch>
+        </p:blipFill>
+        <p:spPr>
+          <a:xfrm>
+            <a:off x="7782554" y="1831269"/>
+            <a:ext cx="3371631" cy="2247754"/>
+          </a:xfrm>
+          <a:prstGeom prst="rect">
+            <a:avLst/>
+          </a:prstGeom>
+        </p:spPr>
+      </p:pic>
+      <p:pic>
+        <p:nvPicPr>
+          <p:cNvPr id="13" name="Picture 12" descr="A screenshot of a cell phone&#10;&#10;Description automatically generated">
+            <a:extLst>
+              <a:ext uri="{FF2B5EF4-FFF2-40B4-BE49-F238E27FC236}">
+                <a16:creationId xmlns:a16="http://schemas.microsoft.com/office/drawing/2014/main" id="{FD0ADC3D-8EE8-42F5-959D-9FC49DCCB1DA}"/>
+              </a:ext>
+            </a:extLst>
+          </p:cNvPr>
+          <p:cNvPicPr>
+            <a:picLocks noChangeAspect="1"/>
+          </p:cNvPicPr>
+          <p:nvPr/>
+        </p:nvPicPr>
+        <p:blipFill>
+          <a:blip r:embed="rId6">
+            <a:extLst>
+              <a:ext uri="{28A0092B-C50C-407E-A947-70E740481C1C}">
+                <a14:useLocalDpi xmlns:a14="http://schemas.microsoft.com/office/drawing/2010/main" val="0"/>
+              </a:ext>
+            </a:extLst>
+          </a:blip>
+          <a:stretch>
+            <a:fillRect/>
+          </a:stretch>
+        </p:blipFill>
+        <p:spPr>
+          <a:xfrm>
+            <a:off x="7304268" y="4480303"/>
+            <a:ext cx="3213736" cy="2142490"/>
+          </a:xfrm>
+          <a:prstGeom prst="rect">
+            <a:avLst/>
+          </a:prstGeom>
+        </p:spPr>
+      </p:pic>
     </p:spTree>
     <p:extLst>
       <p:ext uri="{BB962C8B-B14F-4D97-AF65-F5344CB8AC3E}">
-        <p14:creationId xmlns:p14="http://schemas.microsoft.com/office/powerpoint/2010/main" val="422892717"/>
+        <p14:creationId xmlns:p14="http://schemas.microsoft.com/office/powerpoint/2010/main" val="3630897360"/>
       </p:ext>
     </p:extLst>
   </p:cSld>
@@ -5367,92 +5805,102 @@
           <a:chExt cx="0" cy="0"/>
         </a:xfrm>
       </p:grpSpPr>
-      <p:sp>
-        <p:nvSpPr>
-          <p:cNvPr id="2" name="Title 1">
-            <a:extLst>
-              <a:ext uri="{FF2B5EF4-FFF2-40B4-BE49-F238E27FC236}">
-                <a16:creationId xmlns:a16="http://schemas.microsoft.com/office/drawing/2014/main" id="{D10D6126-F040-4F9D-84C9-7C668D0CF058}"/>
-              </a:ext>
-            </a:extLst>
-          </p:cNvPr>
-          <p:cNvSpPr>
-            <a:spLocks noGrp="1"/>
-          </p:cNvSpPr>
-          <p:nvPr>
-            <p:ph type="title"/>
-          </p:nvPr>
-        </p:nvSpPr>
-        <p:spPr/>
-        <p:txBody>
-          <a:bodyPr/>
-          <a:lstStyle/>
-          <a:p>
-            <a:r>
-              <a:rPr lang="en-US" dirty="0"/>
-              <a:t>What do we wish we could have looked at</a:t>
-            </a:r>
-          </a:p>
-        </p:txBody>
-      </p:sp>
-      <p:sp>
-        <p:nvSpPr>
-          <p:cNvPr id="3" name="Content Placeholder 2">
-            <a:extLst>
-              <a:ext uri="{FF2B5EF4-FFF2-40B4-BE49-F238E27FC236}">
-                <a16:creationId xmlns:a16="http://schemas.microsoft.com/office/drawing/2014/main" id="{4AF771E1-3D21-4B7C-8DD3-7356F754AB70}"/>
-              </a:ext>
-            </a:extLst>
-          </p:cNvPr>
-          <p:cNvSpPr>
-            <a:spLocks noGrp="1"/>
-          </p:cNvSpPr>
-          <p:nvPr>
-            <p:ph idx="1"/>
-          </p:nvPr>
-        </p:nvSpPr>
-        <p:spPr/>
-        <p:txBody>
-          <a:bodyPr/>
-          <a:lstStyle/>
-          <a:p>
-            <a:r>
-              <a:rPr lang="en-US" dirty="0"/>
-              <a:t>If we had more time</a:t>
-            </a:r>
-          </a:p>
-          <a:p>
-            <a:pPr lvl="1"/>
-            <a:r>
-              <a:rPr lang="en-US" dirty="0"/>
-              <a:t>Normal distribution of health inspection to price category.</a:t>
-            </a:r>
-          </a:p>
-          <a:p>
-            <a:pPr lvl="1"/>
-            <a:r>
-              <a:rPr lang="en-US" dirty="0"/>
-              <a:t>We focused on Portland not enough expensive restaurants </a:t>
-            </a:r>
-          </a:p>
-          <a:p>
-            <a:pPr marL="457200" lvl="1" indent="0">
-              <a:buNone/>
-            </a:pPr>
-            <a:endParaRPr lang="en-US" dirty="0"/>
-          </a:p>
-          <a:p>
-            <a:pPr marL="0" indent="0">
-              <a:buNone/>
-            </a:pPr>
-            <a:endParaRPr lang="en-US" dirty="0"/>
-          </a:p>
-        </p:txBody>
-      </p:sp>
+      <p:pic>
+        <p:nvPicPr>
+          <p:cNvPr id="4" name="Picture 3">
+            <a:extLst>
+              <a:ext uri="{FF2B5EF4-FFF2-40B4-BE49-F238E27FC236}">
+                <a16:creationId xmlns:a16="http://schemas.microsoft.com/office/drawing/2014/main" id="{0B2CF36D-8E94-4629-8AC3-C6861B049AF1}"/>
+              </a:ext>
+            </a:extLst>
+          </p:cNvPr>
+          <p:cNvPicPr>
+            <a:picLocks noChangeAspect="1"/>
+          </p:cNvPicPr>
+          <p:nvPr/>
+        </p:nvPicPr>
+        <p:blipFill>
+          <a:blip r:embed="rId2">
+            <a:alphaModFix amt="93000"/>
+          </a:blip>
+          <a:stretch>
+            <a:fillRect/>
+          </a:stretch>
+        </p:blipFill>
+        <p:spPr>
+          <a:xfrm>
+            <a:off x="8126629" y="3973070"/>
+            <a:ext cx="3876675" cy="2628900"/>
+          </a:xfrm>
+          <a:prstGeom prst="rect">
+            <a:avLst/>
+          </a:prstGeom>
+        </p:spPr>
+      </p:pic>
+      <p:pic>
+        <p:nvPicPr>
+          <p:cNvPr id="5" name="Picture 4">
+            <a:extLst>
+              <a:ext uri="{FF2B5EF4-FFF2-40B4-BE49-F238E27FC236}">
+                <a16:creationId xmlns:a16="http://schemas.microsoft.com/office/drawing/2014/main" id="{DB3C562C-63BC-4B50-9DEF-7E63FC066F20}"/>
+              </a:ext>
+            </a:extLst>
+          </p:cNvPr>
+          <p:cNvPicPr>
+            <a:picLocks noChangeAspect="1"/>
+          </p:cNvPicPr>
+          <p:nvPr/>
+        </p:nvPicPr>
+        <p:blipFill>
+          <a:blip r:embed="rId3"/>
+          <a:stretch>
+            <a:fillRect/>
+          </a:stretch>
+        </p:blipFill>
+        <p:spPr>
+          <a:xfrm>
+            <a:off x="4065372" y="2308311"/>
+            <a:ext cx="3952875" cy="2714625"/>
+          </a:xfrm>
+          <a:prstGeom prst="rect">
+            <a:avLst/>
+          </a:prstGeom>
+        </p:spPr>
+      </p:pic>
+      <p:pic>
+        <p:nvPicPr>
+          <p:cNvPr id="6" name="Picture 5">
+            <a:extLst>
+              <a:ext uri="{FF2B5EF4-FFF2-40B4-BE49-F238E27FC236}">
+                <a16:creationId xmlns:a16="http://schemas.microsoft.com/office/drawing/2014/main" id="{ADF6462B-43C7-4973-BD5F-665E80EF6333}"/>
+              </a:ext>
+            </a:extLst>
+          </p:cNvPr>
+          <p:cNvPicPr>
+            <a:picLocks noChangeAspect="1"/>
+          </p:cNvPicPr>
+          <p:nvPr/>
+        </p:nvPicPr>
+        <p:blipFill>
+          <a:blip r:embed="rId4"/>
+          <a:stretch>
+            <a:fillRect/>
+          </a:stretch>
+        </p:blipFill>
+        <p:spPr>
+          <a:xfrm>
+            <a:off x="156515" y="270933"/>
+            <a:ext cx="3800475" cy="3048000"/>
+          </a:xfrm>
+          <a:prstGeom prst="rect">
+            <a:avLst/>
+          </a:prstGeom>
+        </p:spPr>
+      </p:pic>
     </p:spTree>
     <p:extLst>
       <p:ext uri="{BB962C8B-B14F-4D97-AF65-F5344CB8AC3E}">
-        <p14:creationId xmlns:p14="http://schemas.microsoft.com/office/powerpoint/2010/main" val="3392035681"/>
+        <p14:creationId xmlns:p14="http://schemas.microsoft.com/office/powerpoint/2010/main" val="1061299718"/>
       </p:ext>
     </p:extLst>
   </p:cSld>
@@ -5502,7 +5950,7 @@
           <a:p>
             <a:r>
               <a:rPr lang="en-US" dirty="0"/>
-              <a:t>Who cares?</a:t>
+              <a:t>Why do you care?</a:t>
             </a:r>
           </a:p>
         </p:txBody>
@@ -5539,19 +5987,16 @@
           <a:p>
             <a:r>
               <a:rPr lang="en-US" dirty="0"/>
-              <a:t>We wanted to know if price influences the outcome of a Health Inspection</a:t>
-            </a:r>
-          </a:p>
-          <a:p>
-            <a:pPr marL="0" indent="0">
-              <a:buNone/>
-            </a:pPr>
+              <a:t>We wanted to know if price is related to the outcome of a Health Inspection</a:t>
+            </a:r>
+          </a:p>
+          <a:p>
             <a:endParaRPr lang="en-US" dirty="0"/>
           </a:p>
           <a:p>
             <a:r>
               <a:rPr lang="en-US" dirty="0"/>
-              <a:t>What we found to be true is</a:t>
+              <a:t>Our hypothesis</a:t>
             </a:r>
           </a:p>
         </p:txBody>
@@ -5586,84 +6031,42 @@
           <a:chExt cx="0" cy="0"/>
         </a:xfrm>
       </p:grpSpPr>
-      <p:sp>
-        <p:nvSpPr>
-          <p:cNvPr id="2" name="Title 1">
-            <a:extLst>
-              <a:ext uri="{FF2B5EF4-FFF2-40B4-BE49-F238E27FC236}">
-                <a16:creationId xmlns:a16="http://schemas.microsoft.com/office/drawing/2014/main" id="{A38AE8E9-C55C-4C82-AD35-1A3784C0709B}"/>
-              </a:ext>
-            </a:extLst>
-          </p:cNvPr>
-          <p:cNvSpPr>
-            <a:spLocks noGrp="1"/>
-          </p:cNvSpPr>
-          <p:nvPr>
-            <p:ph type="title"/>
-          </p:nvPr>
-        </p:nvSpPr>
+      <p:pic>
+        <p:nvPicPr>
+          <p:cNvPr id="4" name="Picture 3">
+            <a:extLst>
+              <a:ext uri="{FF2B5EF4-FFF2-40B4-BE49-F238E27FC236}">
+                <a16:creationId xmlns:a16="http://schemas.microsoft.com/office/drawing/2014/main" id="{6B453EC5-50C0-4FDD-AD89-CA251110E26F}"/>
+              </a:ext>
+            </a:extLst>
+          </p:cNvPr>
+          <p:cNvPicPr>
+            <a:picLocks noChangeAspect="1"/>
+          </p:cNvPicPr>
+          <p:nvPr/>
+        </p:nvPicPr>
+        <p:blipFill>
+          <a:blip r:embed="rId2">
+            <a:alphaModFix amt="93000"/>
+          </a:blip>
+          <a:stretch>
+            <a:fillRect/>
+          </a:stretch>
+        </p:blipFill>
         <p:spPr>
           <a:xfrm>
-            <a:off x="838200" y="365125"/>
-            <a:ext cx="10515600" cy="2936875"/>
+            <a:off x="970688" y="276012"/>
+            <a:ext cx="10250623" cy="6305976"/>
           </a:xfrm>
+          <a:prstGeom prst="rect">
+            <a:avLst/>
+          </a:prstGeom>
         </p:spPr>
-        <p:txBody>
-          <a:bodyPr/>
-          <a:lstStyle/>
-          <a:p>
-            <a:pPr algn="ctr"/>
-            <a:r>
-              <a:rPr lang="en-US" dirty="0"/>
-              <a:t>Thank you for your time	</a:t>
-            </a:r>
-          </a:p>
-        </p:txBody>
-      </p:sp>
-      <p:sp>
-        <p:nvSpPr>
-          <p:cNvPr id="3" name="Content Placeholder 2">
-            <a:extLst>
-              <a:ext uri="{FF2B5EF4-FFF2-40B4-BE49-F238E27FC236}">
-                <a16:creationId xmlns:a16="http://schemas.microsoft.com/office/drawing/2014/main" id="{8B95687A-BB1B-41E3-B254-00E156B17E95}"/>
-              </a:ext>
-            </a:extLst>
-          </p:cNvPr>
-          <p:cNvSpPr>
-            <a:spLocks noGrp="1"/>
-          </p:cNvSpPr>
-          <p:nvPr>
-            <p:ph idx="1"/>
-          </p:nvPr>
-        </p:nvSpPr>
-        <p:spPr>
-          <a:xfrm>
-            <a:off x="838200" y="4521200"/>
-            <a:ext cx="10515600" cy="1612900"/>
-          </a:xfrm>
-        </p:spPr>
-        <p:txBody>
-          <a:bodyPr/>
-          <a:lstStyle/>
-          <a:p>
-            <a:pPr algn="ctr"/>
-            <a:endParaRPr lang="en-US" dirty="0"/>
-          </a:p>
-          <a:p>
-            <a:pPr marL="0" indent="0" algn="ctr">
-              <a:buNone/>
-            </a:pPr>
-            <a:r>
-              <a:rPr lang="en-US" dirty="0"/>
-              <a:t>Questions?</a:t>
-            </a:r>
-          </a:p>
-        </p:txBody>
-      </p:sp>
+      </p:pic>
     </p:spTree>
     <p:extLst>
       <p:ext uri="{BB962C8B-B14F-4D97-AF65-F5344CB8AC3E}">
-        <p14:creationId xmlns:p14="http://schemas.microsoft.com/office/powerpoint/2010/main" val="7658802"/>
+        <p14:creationId xmlns:p14="http://schemas.microsoft.com/office/powerpoint/2010/main" val="2556500076"/>
       </p:ext>
     </p:extLst>
   </p:cSld>
@@ -5695,7 +6098,7 @@
           <p:cNvPr id="2" name="Title 1">
             <a:extLst>
               <a:ext uri="{FF2B5EF4-FFF2-40B4-BE49-F238E27FC236}">
-                <a16:creationId xmlns:a16="http://schemas.microsoft.com/office/drawing/2014/main" id="{376566FC-C8EA-4093-B6C8-D8CE94856BA9}"/>
+                <a16:creationId xmlns:a16="http://schemas.microsoft.com/office/drawing/2014/main" id="{D0B1C1E6-F0EC-495A-9CD4-93351601C446}"/>
               </a:ext>
             </a:extLst>
           </p:cNvPr>
@@ -5713,194 +6116,72 @@
           <a:p>
             <a:r>
               <a:rPr lang="en-US" dirty="0"/>
-              <a:t>What was the first relationships we looked at?</a:t>
-            </a:r>
-          </a:p>
-        </p:txBody>
-      </p:sp>
-      <p:pic>
-        <p:nvPicPr>
-          <p:cNvPr id="5" name="Content Placeholder 4" descr="A screenshot of a cell phone&#10;&#10;Description automatically generated">
-            <a:extLst>
-              <a:ext uri="{FF2B5EF4-FFF2-40B4-BE49-F238E27FC236}">
-                <a16:creationId xmlns:a16="http://schemas.microsoft.com/office/drawing/2014/main" id="{18BEA69E-B828-40C2-AFBD-89925F84826F}"/>
-              </a:ext>
-            </a:extLst>
-          </p:cNvPr>
-          <p:cNvPicPr>
-            <a:picLocks noGrp="1" noChangeAspect="1"/>
-          </p:cNvPicPr>
+              <a:t>Why we are right if we are?</a:t>
+            </a:r>
+          </a:p>
+        </p:txBody>
+      </p:sp>
+      <p:sp>
+        <p:nvSpPr>
+          <p:cNvPr id="3" name="Content Placeholder 2">
+            <a:extLst>
+              <a:ext uri="{FF2B5EF4-FFF2-40B4-BE49-F238E27FC236}">
+                <a16:creationId xmlns:a16="http://schemas.microsoft.com/office/drawing/2014/main" id="{7C58205A-18BD-4DD1-926B-646A04B076EB}"/>
+              </a:ext>
+            </a:extLst>
+          </p:cNvPr>
+          <p:cNvSpPr>
+            <a:spLocks noGrp="1"/>
+          </p:cNvSpPr>
           <p:nvPr>
             <p:ph idx="1"/>
           </p:nvPr>
-        </p:nvPicPr>
-        <p:blipFill>
-          <a:blip r:embed="rId2">
-            <a:extLst>
-              <a:ext uri="{28A0092B-C50C-407E-A947-70E740481C1C}">
-                <a14:useLocalDpi xmlns:a14="http://schemas.microsoft.com/office/drawing/2010/main" val="0"/>
-              </a:ext>
-            </a:extLst>
-          </a:blip>
-          <a:stretch>
-            <a:fillRect/>
-          </a:stretch>
-        </p:blipFill>
-        <p:spPr>
-          <a:xfrm>
-            <a:off x="27043" y="1308755"/>
-            <a:ext cx="4656938" cy="3104625"/>
-          </a:xfrm>
-        </p:spPr>
-      </p:pic>
-      <p:pic>
-        <p:nvPicPr>
-          <p:cNvPr id="7" name="Picture 6" descr="A screenshot of a cell phone&#10;&#10;Description automatically generated">
-            <a:extLst>
-              <a:ext uri="{FF2B5EF4-FFF2-40B4-BE49-F238E27FC236}">
-                <a16:creationId xmlns:a16="http://schemas.microsoft.com/office/drawing/2014/main" id="{2ED177B3-9145-4F2F-AD5F-ACA4D52F0C7A}"/>
-              </a:ext>
-            </a:extLst>
-          </p:cNvPr>
-          <p:cNvPicPr>
-            <a:picLocks noChangeAspect="1"/>
-          </p:cNvPicPr>
-          <p:nvPr/>
-        </p:nvPicPr>
-        <p:blipFill>
-          <a:blip r:embed="rId3">
-            <a:extLst>
-              <a:ext uri="{28A0092B-C50C-407E-A947-70E740481C1C}">
-                <a14:useLocalDpi xmlns:a14="http://schemas.microsoft.com/office/drawing/2010/main" val="0"/>
-              </a:ext>
-            </a:extLst>
-          </a:blip>
-          <a:stretch>
-            <a:fillRect/>
-          </a:stretch>
-        </p:blipFill>
-        <p:spPr>
-          <a:xfrm>
-            <a:off x="1283003" y="4610222"/>
-            <a:ext cx="2823980" cy="1882653"/>
-          </a:xfrm>
-          <a:prstGeom prst="rect">
-            <a:avLst/>
-          </a:prstGeom>
-        </p:spPr>
-      </p:pic>
-      <p:pic>
-        <p:nvPicPr>
-          <p:cNvPr id="9" name="Picture 8" descr="A screenshot of a cell phone&#10;&#10;Description automatically generated">
-            <a:extLst>
-              <a:ext uri="{FF2B5EF4-FFF2-40B4-BE49-F238E27FC236}">
-                <a16:creationId xmlns:a16="http://schemas.microsoft.com/office/drawing/2014/main" id="{9F38D004-BEEC-41B9-A09F-1FE7EE14451C}"/>
-              </a:ext>
-            </a:extLst>
-          </p:cNvPr>
-          <p:cNvPicPr>
-            <a:picLocks noChangeAspect="1"/>
-          </p:cNvPicPr>
-          <p:nvPr/>
-        </p:nvPicPr>
-        <p:blipFill>
-          <a:blip r:embed="rId4">
-            <a:extLst>
-              <a:ext uri="{28A0092B-C50C-407E-A947-70E740481C1C}">
-                <a14:useLocalDpi xmlns:a14="http://schemas.microsoft.com/office/drawing/2010/main" val="0"/>
-              </a:ext>
-            </a:extLst>
-          </a:blip>
-          <a:stretch>
-            <a:fillRect/>
-          </a:stretch>
-        </p:blipFill>
-        <p:spPr>
-          <a:xfrm>
-            <a:off x="4389053" y="3330903"/>
-            <a:ext cx="3039161" cy="2026107"/>
-          </a:xfrm>
-          <a:prstGeom prst="rect">
-            <a:avLst/>
-          </a:prstGeom>
-        </p:spPr>
-      </p:pic>
-      <p:pic>
-        <p:nvPicPr>
-          <p:cNvPr id="11" name="Picture 10" descr="A screenshot of a cell phone&#10;&#10;Description automatically generated">
-            <a:extLst>
-              <a:ext uri="{FF2B5EF4-FFF2-40B4-BE49-F238E27FC236}">
-                <a16:creationId xmlns:a16="http://schemas.microsoft.com/office/drawing/2014/main" id="{E36CE1E1-4847-46F1-BB19-FA2ADD28139B}"/>
-              </a:ext>
-            </a:extLst>
-          </p:cNvPr>
-          <p:cNvPicPr>
-            <a:picLocks noChangeAspect="1"/>
-          </p:cNvPicPr>
-          <p:nvPr/>
-        </p:nvPicPr>
-        <p:blipFill>
-          <a:blip r:embed="rId5">
-            <a:extLst>
-              <a:ext uri="{28A0092B-C50C-407E-A947-70E740481C1C}">
-                <a14:useLocalDpi xmlns:a14="http://schemas.microsoft.com/office/drawing/2010/main" val="0"/>
-              </a:ext>
-            </a:extLst>
-          </a:blip>
-          <a:stretch>
-            <a:fillRect/>
-          </a:stretch>
-        </p:blipFill>
-        <p:spPr>
-          <a:xfrm>
-            <a:off x="7782554" y="1831269"/>
-            <a:ext cx="3371631" cy="2247754"/>
-          </a:xfrm>
-          <a:prstGeom prst="rect">
-            <a:avLst/>
-          </a:prstGeom>
-        </p:spPr>
-      </p:pic>
-      <p:pic>
-        <p:nvPicPr>
-          <p:cNvPr id="13" name="Picture 12" descr="A screenshot of a cell phone&#10;&#10;Description automatically generated">
-            <a:extLst>
-              <a:ext uri="{FF2B5EF4-FFF2-40B4-BE49-F238E27FC236}">
-                <a16:creationId xmlns:a16="http://schemas.microsoft.com/office/drawing/2014/main" id="{FD0ADC3D-8EE8-42F5-959D-9FC49DCCB1DA}"/>
-              </a:ext>
-            </a:extLst>
-          </p:cNvPr>
-          <p:cNvPicPr>
-            <a:picLocks noChangeAspect="1"/>
-          </p:cNvPicPr>
-          <p:nvPr/>
-        </p:nvPicPr>
-        <p:blipFill>
-          <a:blip r:embed="rId6">
-            <a:extLst>
-              <a:ext uri="{28A0092B-C50C-407E-A947-70E740481C1C}">
-                <a14:useLocalDpi xmlns:a14="http://schemas.microsoft.com/office/drawing/2010/main" val="0"/>
-              </a:ext>
-            </a:extLst>
-          </a:blip>
-          <a:stretch>
-            <a:fillRect/>
-          </a:stretch>
-        </p:blipFill>
-        <p:spPr>
-          <a:xfrm>
-            <a:off x="7304268" y="4480303"/>
-            <a:ext cx="3213736" cy="2142490"/>
-          </a:xfrm>
-          <a:prstGeom prst="rect">
-            <a:avLst/>
-          </a:prstGeom>
-        </p:spPr>
-      </p:pic>
+        </p:nvSpPr>
+        <p:spPr/>
+        <p:txBody>
+          <a:bodyPr>
+            <a:normAutofit fontScale="92500" lnSpcReduction="10000"/>
+          </a:bodyPr>
+          <a:lstStyle/>
+          <a:p>
+            <a:r>
+              <a:rPr lang="en-US" dirty="0"/>
+              <a:t>Our assumption was the more expensive a restaurant is the better the health score.</a:t>
+            </a:r>
+          </a:p>
+          <a:p>
+            <a:endParaRPr lang="en-US" dirty="0"/>
+          </a:p>
+          <a:p>
+            <a:r>
+              <a:rPr lang="en-US" dirty="0"/>
+              <a:t>What we found was 87 business with an Expensive rating scored 94% on a health inspection</a:t>
+            </a:r>
+          </a:p>
+          <a:p>
+            <a:endParaRPr lang="en-US" dirty="0"/>
+          </a:p>
+          <a:p>
+            <a:r>
+              <a:rPr lang="en-US" dirty="0"/>
+              <a:t>We found that 855business with cheap rating scored 95% on a health inspection</a:t>
+            </a:r>
+          </a:p>
+          <a:p>
+            <a:endParaRPr lang="en-US" dirty="0"/>
+          </a:p>
+          <a:p>
+            <a:r>
+              <a:rPr lang="en-US" dirty="0"/>
+              <a:t>We found that 1153 business with a Mid rating scored 94% on a health inspection </a:t>
+            </a:r>
+          </a:p>
+        </p:txBody>
+      </p:sp>
     </p:spTree>
     <p:extLst>
       <p:ext uri="{BB962C8B-B14F-4D97-AF65-F5344CB8AC3E}">
-        <p14:creationId xmlns:p14="http://schemas.microsoft.com/office/powerpoint/2010/main" val="3630897360"/>
+        <p14:creationId xmlns:p14="http://schemas.microsoft.com/office/powerpoint/2010/main" val="3958127287"/>
       </p:ext>
     </p:extLst>
   </p:cSld>
@@ -5932,6 +6213,224 @@
           <p:cNvPr id="2" name="Title 1">
             <a:extLst>
               <a:ext uri="{FF2B5EF4-FFF2-40B4-BE49-F238E27FC236}">
+                <a16:creationId xmlns:a16="http://schemas.microsoft.com/office/drawing/2014/main" id="{A2717ECB-5E16-4022-857C-6CEAE49538DD}"/>
+              </a:ext>
+            </a:extLst>
+          </p:cNvPr>
+          <p:cNvSpPr>
+            <a:spLocks noGrp="1"/>
+          </p:cNvSpPr>
+          <p:nvPr>
+            <p:ph type="title"/>
+          </p:nvPr>
+        </p:nvSpPr>
+        <p:spPr/>
+        <p:txBody>
+          <a:bodyPr/>
+          <a:lstStyle/>
+          <a:p>
+            <a:r>
+              <a:rPr lang="en-US" dirty="0"/>
+              <a:t>Memories </a:t>
+            </a:r>
+          </a:p>
+        </p:txBody>
+      </p:sp>
+      <p:sp>
+        <p:nvSpPr>
+          <p:cNvPr id="3" name="Content Placeholder 2">
+            <a:extLst>
+              <a:ext uri="{FF2B5EF4-FFF2-40B4-BE49-F238E27FC236}">
+                <a16:creationId xmlns:a16="http://schemas.microsoft.com/office/drawing/2014/main" id="{4C08FD03-AB9D-4B90-BDFF-D05313DD5511}"/>
+              </a:ext>
+            </a:extLst>
+          </p:cNvPr>
+          <p:cNvSpPr>
+            <a:spLocks noGrp="1"/>
+          </p:cNvSpPr>
+          <p:nvPr>
+            <p:ph idx="1"/>
+          </p:nvPr>
+        </p:nvSpPr>
+        <p:spPr/>
+        <p:txBody>
+          <a:bodyPr/>
+          <a:lstStyle/>
+          <a:p>
+            <a:r>
+              <a:rPr lang="en-US" dirty="0"/>
+              <a:t>Things that well</a:t>
+            </a:r>
+          </a:p>
+          <a:p>
+            <a:pPr marL="457200" lvl="1" indent="0">
+              <a:buNone/>
+            </a:pPr>
+            <a:endParaRPr lang="en-US" dirty="0"/>
+          </a:p>
+          <a:p>
+            <a:pPr marL="0" indent="0">
+              <a:buNone/>
+            </a:pPr>
+            <a:endParaRPr lang="en-US" dirty="0"/>
+          </a:p>
+          <a:p>
+            <a:r>
+              <a:rPr lang="en-US" dirty="0"/>
+              <a:t>Things that happened </a:t>
+            </a:r>
+          </a:p>
+          <a:p>
+            <a:endParaRPr lang="en-US" dirty="0"/>
+          </a:p>
+          <a:p>
+            <a:pPr marL="0" indent="0">
+              <a:buNone/>
+            </a:pPr>
+            <a:endParaRPr lang="en-US" dirty="0"/>
+          </a:p>
+          <a:p>
+            <a:r>
+              <a:rPr lang="en-US" dirty="0"/>
+              <a:t>Things that became a pain</a:t>
+            </a:r>
+          </a:p>
+        </p:txBody>
+      </p:sp>
+    </p:spTree>
+    <p:extLst>
+      <p:ext uri="{BB962C8B-B14F-4D97-AF65-F5344CB8AC3E}">
+        <p14:creationId xmlns:p14="http://schemas.microsoft.com/office/powerpoint/2010/main" val="422892717"/>
+      </p:ext>
+    </p:extLst>
+  </p:cSld>
+  <p:clrMapOvr>
+    <a:masterClrMapping/>
+  </p:clrMapOvr>
+</p:sld>
+</file>
+
+<file path=ppt/slides/slide23.xml><?xml version="1.0" encoding="utf-8"?>
+<p:sld xmlns:a="http://schemas.openxmlformats.org/drawingml/2006/main" xmlns:r="http://schemas.openxmlformats.org/officeDocument/2006/relationships" xmlns:p="http://schemas.openxmlformats.org/presentationml/2006/main">
+  <p:cSld>
+    <p:spTree>
+      <p:nvGrpSpPr>
+        <p:cNvPr id="1" name=""/>
+        <p:cNvGrpSpPr/>
+        <p:nvPr/>
+      </p:nvGrpSpPr>
+      <p:grpSpPr>
+        <a:xfrm>
+          <a:off x="0" y="0"/>
+          <a:ext cx="0" cy="0"/>
+          <a:chOff x="0" y="0"/>
+          <a:chExt cx="0" cy="0"/>
+        </a:xfrm>
+      </p:grpSpPr>
+      <p:sp>
+        <p:nvSpPr>
+          <p:cNvPr id="2" name="Title 1">
+            <a:extLst>
+              <a:ext uri="{FF2B5EF4-FFF2-40B4-BE49-F238E27FC236}">
+                <a16:creationId xmlns:a16="http://schemas.microsoft.com/office/drawing/2014/main" id="{D10D6126-F040-4F9D-84C9-7C668D0CF058}"/>
+              </a:ext>
+            </a:extLst>
+          </p:cNvPr>
+          <p:cNvSpPr>
+            <a:spLocks noGrp="1"/>
+          </p:cNvSpPr>
+          <p:nvPr>
+            <p:ph type="title"/>
+          </p:nvPr>
+        </p:nvSpPr>
+        <p:spPr/>
+        <p:txBody>
+          <a:bodyPr/>
+          <a:lstStyle/>
+          <a:p>
+            <a:r>
+              <a:rPr lang="en-US" dirty="0"/>
+              <a:t>What do we wish we could have looked at</a:t>
+            </a:r>
+          </a:p>
+        </p:txBody>
+      </p:sp>
+      <p:sp>
+        <p:nvSpPr>
+          <p:cNvPr id="3" name="Content Placeholder 2">
+            <a:extLst>
+              <a:ext uri="{FF2B5EF4-FFF2-40B4-BE49-F238E27FC236}">
+                <a16:creationId xmlns:a16="http://schemas.microsoft.com/office/drawing/2014/main" id="{4AF771E1-3D21-4B7C-8DD3-7356F754AB70}"/>
+              </a:ext>
+            </a:extLst>
+          </p:cNvPr>
+          <p:cNvSpPr>
+            <a:spLocks noGrp="1"/>
+          </p:cNvSpPr>
+          <p:nvPr>
+            <p:ph idx="1"/>
+          </p:nvPr>
+        </p:nvSpPr>
+        <p:spPr/>
+        <p:txBody>
+          <a:bodyPr/>
+          <a:lstStyle/>
+          <a:p>
+            <a:pPr marL="457200" lvl="1" indent="0">
+              <a:buNone/>
+            </a:pPr>
+            <a:endParaRPr lang="en-US" dirty="0"/>
+          </a:p>
+          <a:p>
+            <a:pPr lvl="1"/>
+            <a:r>
+              <a:rPr lang="en-US" dirty="0"/>
+              <a:t>More data</a:t>
+            </a:r>
+          </a:p>
+          <a:p>
+            <a:pPr marL="0" indent="0">
+              <a:buNone/>
+            </a:pPr>
+            <a:endParaRPr lang="en-US" dirty="0"/>
+          </a:p>
+        </p:txBody>
+      </p:sp>
+    </p:spTree>
+    <p:extLst>
+      <p:ext uri="{BB962C8B-B14F-4D97-AF65-F5344CB8AC3E}">
+        <p14:creationId xmlns:p14="http://schemas.microsoft.com/office/powerpoint/2010/main" val="3392035681"/>
+      </p:ext>
+    </p:extLst>
+  </p:cSld>
+  <p:clrMapOvr>
+    <a:masterClrMapping/>
+  </p:clrMapOvr>
+</p:sld>
+</file>
+
+<file path=ppt/slides/slide24.xml><?xml version="1.0" encoding="utf-8"?>
+<p:sld xmlns:a="http://schemas.openxmlformats.org/drawingml/2006/main" xmlns:r="http://schemas.openxmlformats.org/officeDocument/2006/relationships" xmlns:p="http://schemas.openxmlformats.org/presentationml/2006/main">
+  <p:cSld>
+    <p:spTree>
+      <p:nvGrpSpPr>
+        <p:cNvPr id="1" name=""/>
+        <p:cNvGrpSpPr/>
+        <p:nvPr/>
+      </p:nvGrpSpPr>
+      <p:grpSpPr>
+        <a:xfrm>
+          <a:off x="0" y="0"/>
+          <a:ext cx="0" cy="0"/>
+          <a:chOff x="0" y="0"/>
+          <a:chExt cx="0" cy="0"/>
+        </a:xfrm>
+      </p:grpSpPr>
+      <p:sp>
+        <p:nvSpPr>
+          <p:cNvPr id="2" name="Title 1">
+            <a:extLst>
+              <a:ext uri="{FF2B5EF4-FFF2-40B4-BE49-F238E27FC236}">
                 <a16:creationId xmlns:a16="http://schemas.microsoft.com/office/drawing/2014/main" id="{33FEAD5E-F809-49AA-B574-EA32265AACC7}"/>
               </a:ext>
             </a:extLst>
@@ -5977,10 +6476,43 @@
           <a:bodyPr/>
           <a:lstStyle/>
           <a:p>
+            <a:pPr marL="0" indent="0">
+              <a:buNone/>
+            </a:pPr>
             <a:r>
               <a:rPr lang="en-US" dirty="0"/>
-              <a:t>insights you had while exploring the data that you didn't anticipate</a:t>
-            </a:r>
+              <a:t>Insights you had while exploring the data that you didn't anticipate</a:t>
+            </a:r>
+          </a:p>
+          <a:p>
+            <a:endParaRPr lang="en-US" dirty="0"/>
+          </a:p>
+          <a:p>
+            <a:endParaRPr lang="en-US" dirty="0"/>
+          </a:p>
+          <a:p>
+            <a:pPr marL="0" indent="0">
+              <a:buNone/>
+            </a:pPr>
+            <a:endParaRPr lang="en-US" dirty="0"/>
+          </a:p>
+          <a:p>
+            <a:pPr marL="0" indent="0" algn="ctr">
+              <a:buNone/>
+            </a:pPr>
+            <a:r>
+              <a:rPr lang="en-US" dirty="0">
+                <a:hlinkClick r:id="rId2"/>
+              </a:rPr>
+              <a:t>It just doesn't matter</a:t>
+            </a:r>
+            <a:endParaRPr lang="en-US" dirty="0"/>
+          </a:p>
+          <a:p>
+            <a:pPr marL="0" indent="0">
+              <a:buNone/>
+            </a:pPr>
+            <a:endParaRPr lang="en-US" dirty="0"/>
           </a:p>
         </p:txBody>
       </p:sp>
@@ -5988,6 +6520,110 @@
     <p:extLst>
       <p:ext uri="{BB962C8B-B14F-4D97-AF65-F5344CB8AC3E}">
         <p14:creationId xmlns:p14="http://schemas.microsoft.com/office/powerpoint/2010/main" val="2307058140"/>
+      </p:ext>
+    </p:extLst>
+  </p:cSld>
+  <p:clrMapOvr>
+    <a:masterClrMapping/>
+  </p:clrMapOvr>
+</p:sld>
+</file>
+
+<file path=ppt/slides/slide25.xml><?xml version="1.0" encoding="utf-8"?>
+<p:sld xmlns:a="http://schemas.openxmlformats.org/drawingml/2006/main" xmlns:r="http://schemas.openxmlformats.org/officeDocument/2006/relationships" xmlns:p="http://schemas.openxmlformats.org/presentationml/2006/main">
+  <p:cSld>
+    <p:spTree>
+      <p:nvGrpSpPr>
+        <p:cNvPr id="1" name=""/>
+        <p:cNvGrpSpPr/>
+        <p:nvPr/>
+      </p:nvGrpSpPr>
+      <p:grpSpPr>
+        <a:xfrm>
+          <a:off x="0" y="0"/>
+          <a:ext cx="0" cy="0"/>
+          <a:chOff x="0" y="0"/>
+          <a:chExt cx="0" cy="0"/>
+        </a:xfrm>
+      </p:grpSpPr>
+      <p:sp>
+        <p:nvSpPr>
+          <p:cNvPr id="2" name="Title 1">
+            <a:extLst>
+              <a:ext uri="{FF2B5EF4-FFF2-40B4-BE49-F238E27FC236}">
+                <a16:creationId xmlns:a16="http://schemas.microsoft.com/office/drawing/2014/main" id="{A38AE8E9-C55C-4C82-AD35-1A3784C0709B}"/>
+              </a:ext>
+            </a:extLst>
+          </p:cNvPr>
+          <p:cNvSpPr>
+            <a:spLocks noGrp="1"/>
+          </p:cNvSpPr>
+          <p:nvPr>
+            <p:ph type="title"/>
+          </p:nvPr>
+        </p:nvSpPr>
+        <p:spPr>
+          <a:xfrm>
+            <a:off x="838200" y="365125"/>
+            <a:ext cx="10515600" cy="2936875"/>
+          </a:xfrm>
+        </p:spPr>
+        <p:txBody>
+          <a:bodyPr/>
+          <a:lstStyle/>
+          <a:p>
+            <a:pPr algn="ctr"/>
+            <a:r>
+              <a:rPr lang="en-US" dirty="0"/>
+              <a:t>Thank you for your time	</a:t>
+            </a:r>
+          </a:p>
+        </p:txBody>
+      </p:sp>
+      <p:sp>
+        <p:nvSpPr>
+          <p:cNvPr id="3" name="Content Placeholder 2">
+            <a:extLst>
+              <a:ext uri="{FF2B5EF4-FFF2-40B4-BE49-F238E27FC236}">
+                <a16:creationId xmlns:a16="http://schemas.microsoft.com/office/drawing/2014/main" id="{8B95687A-BB1B-41E3-B254-00E156B17E95}"/>
+              </a:ext>
+            </a:extLst>
+          </p:cNvPr>
+          <p:cNvSpPr>
+            <a:spLocks noGrp="1"/>
+          </p:cNvSpPr>
+          <p:nvPr>
+            <p:ph idx="1"/>
+          </p:nvPr>
+        </p:nvSpPr>
+        <p:spPr>
+          <a:xfrm>
+            <a:off x="838200" y="4521200"/>
+            <a:ext cx="10515600" cy="1612900"/>
+          </a:xfrm>
+        </p:spPr>
+        <p:txBody>
+          <a:bodyPr/>
+          <a:lstStyle/>
+          <a:p>
+            <a:pPr algn="ctr"/>
+            <a:endParaRPr lang="en-US" dirty="0"/>
+          </a:p>
+          <a:p>
+            <a:pPr marL="0" indent="0" algn="ctr">
+              <a:buNone/>
+            </a:pPr>
+            <a:r>
+              <a:rPr lang="en-US" dirty="0"/>
+              <a:t>Questions?</a:t>
+            </a:r>
+          </a:p>
+        </p:txBody>
+      </p:sp>
+    </p:spTree>
+    <p:extLst>
+      <p:ext uri="{BB962C8B-B14F-4D97-AF65-F5344CB8AC3E}">
+        <p14:creationId xmlns:p14="http://schemas.microsoft.com/office/powerpoint/2010/main" val="7658802"/>
       </p:ext>
     </p:extLst>
   </p:cSld>
@@ -6065,7 +6701,9 @@
           </a:xfrm>
         </p:spPr>
         <p:txBody>
-          <a:bodyPr/>
+          <a:bodyPr>
+            <a:normAutofit fontScale="92500" lnSpcReduction="10000"/>
+          </a:bodyPr>
           <a:lstStyle/>
           <a:p>
             <a:r>
@@ -6094,6 +6732,16 @@
           <a:p>
             <a:pPr lvl="1"/>
             <a:r>
+              <a:rPr lang="en-US" dirty="0">
+                <a:hlinkClick r:id="rId3"/>
+              </a:rPr>
+              <a:t>County website </a:t>
+            </a:r>
+            <a:endParaRPr lang="en-US" dirty="0"/>
+          </a:p>
+          <a:p>
+            <a:pPr lvl="1"/>
+            <a:r>
               <a:rPr lang="en-US" dirty="0"/>
               <a:t>County CSV</a:t>
             </a:r>
@@ -6114,13 +6762,13 @@
           <a:p>
             <a:r>
               <a:rPr lang="en-US" dirty="0"/>
-              <a:t>Distro of inspect to rating</a:t>
+              <a:t>Distribution of inspect to rating</a:t>
             </a:r>
           </a:p>
           <a:p>
             <a:r>
               <a:rPr lang="en-US" dirty="0"/>
-              <a:t>Distro of restaurants with similar scores</a:t>
+              <a:t>Distribution of restaurants with similar scores</a:t>
             </a:r>
           </a:p>
           <a:p>
@@ -6188,7 +6836,7 @@
           <a:p>
             <a:r>
               <a:rPr lang="en-US" dirty="0"/>
-              <a:t>We used a phone</a:t>
+              <a:t>We got a CSV from the County</a:t>
             </a:r>
           </a:p>
         </p:txBody>
@@ -6249,8 +6897,8 @@
         </p:blipFill>
         <p:spPr>
           <a:xfrm>
-            <a:off x="1260423" y="1690688"/>
-            <a:ext cx="9973633" cy="5039643"/>
+            <a:off x="838200" y="2190750"/>
+            <a:ext cx="9104884" cy="4600667"/>
           </a:xfrm>
           <a:prstGeom prst="rect">
             <a:avLst/>
@@ -6292,96 +6940,6 @@
           <p:cNvPr id="2" name="Title 1">
             <a:extLst>
               <a:ext uri="{FF2B5EF4-FFF2-40B4-BE49-F238E27FC236}">
-                <a16:creationId xmlns:a16="http://schemas.microsoft.com/office/drawing/2014/main" id="{E983946B-8F15-4BE2-B39C-CF90B4293FEE}"/>
-              </a:ext>
-            </a:extLst>
-          </p:cNvPr>
-          <p:cNvSpPr>
-            <a:spLocks noGrp="1"/>
-          </p:cNvSpPr>
-          <p:nvPr>
-            <p:ph type="title"/>
-          </p:nvPr>
-        </p:nvSpPr>
-        <p:spPr/>
-        <p:txBody>
-          <a:bodyPr/>
-          <a:lstStyle/>
-          <a:p>
-            <a:r>
-              <a:rPr lang="en-US" dirty="0"/>
-              <a:t>We changed direction</a:t>
-            </a:r>
-          </a:p>
-        </p:txBody>
-      </p:sp>
-      <p:pic>
-        <p:nvPicPr>
-          <p:cNvPr id="4" name="Content Placeholder 3">
-            <a:extLst>
-              <a:ext uri="{FF2B5EF4-FFF2-40B4-BE49-F238E27FC236}">
-                <a16:creationId xmlns:a16="http://schemas.microsoft.com/office/drawing/2014/main" id="{8E5A79C5-C511-4B70-80AE-1ACD32A6D2E7}"/>
-              </a:ext>
-            </a:extLst>
-          </p:cNvPr>
-          <p:cNvPicPr>
-            <a:picLocks noGrp="1" noChangeAspect="1"/>
-          </p:cNvPicPr>
-          <p:nvPr>
-            <p:ph idx="1"/>
-          </p:nvPr>
-        </p:nvPicPr>
-        <p:blipFill>
-          <a:blip r:embed="rId3"/>
-          <a:stretch>
-            <a:fillRect/>
-          </a:stretch>
-        </p:blipFill>
-        <p:spPr>
-          <a:xfrm>
-            <a:off x="779477" y="1690688"/>
-            <a:ext cx="10515600" cy="4278669"/>
-          </a:xfrm>
-          <a:prstGeom prst="rect">
-            <a:avLst/>
-          </a:prstGeom>
-        </p:spPr>
-      </p:pic>
-    </p:spTree>
-    <p:extLst>
-      <p:ext uri="{BB962C8B-B14F-4D97-AF65-F5344CB8AC3E}">
-        <p14:creationId xmlns:p14="http://schemas.microsoft.com/office/powerpoint/2010/main" val="1887371778"/>
-      </p:ext>
-    </p:extLst>
-  </p:cSld>
-  <p:clrMapOvr>
-    <a:masterClrMapping/>
-  </p:clrMapOvr>
-</p:sld>
-</file>
-
-<file path=ppt/slides/slide6.xml><?xml version="1.0" encoding="utf-8"?>
-<p:sld xmlns:a="http://schemas.openxmlformats.org/drawingml/2006/main" xmlns:r="http://schemas.openxmlformats.org/officeDocument/2006/relationships" xmlns:p="http://schemas.openxmlformats.org/presentationml/2006/main">
-  <p:cSld>
-    <p:spTree>
-      <p:nvGrpSpPr>
-        <p:cNvPr id="1" name=""/>
-        <p:cNvGrpSpPr/>
-        <p:nvPr/>
-      </p:nvGrpSpPr>
-      <p:grpSpPr>
-        <a:xfrm>
-          <a:off x="0" y="0"/>
-          <a:ext cx="0" cy="0"/>
-          <a:chOff x="0" y="0"/>
-          <a:chExt cx="0" cy="0"/>
-        </a:xfrm>
-      </p:grpSpPr>
-      <p:sp>
-        <p:nvSpPr>
-          <p:cNvPr id="2" name="Title 1">
-            <a:extLst>
-              <a:ext uri="{FF2B5EF4-FFF2-40B4-BE49-F238E27FC236}">
                 <a16:creationId xmlns:a16="http://schemas.microsoft.com/office/drawing/2014/main" id="{80AF8EB5-8BF6-44E5-BDEE-30985B396577}"/>
               </a:ext>
             </a:extLst>
@@ -6450,6 +7008,126 @@
 </p:sld>
 </file>
 
+<file path=ppt/slides/slide6.xml><?xml version="1.0" encoding="utf-8"?>
+<p:sld xmlns:a="http://schemas.openxmlformats.org/drawingml/2006/main" xmlns:r="http://schemas.openxmlformats.org/officeDocument/2006/relationships" xmlns:p="http://schemas.openxmlformats.org/presentationml/2006/main">
+  <p:cSld>
+    <p:spTree>
+      <p:nvGrpSpPr>
+        <p:cNvPr id="1" name=""/>
+        <p:cNvGrpSpPr/>
+        <p:nvPr/>
+      </p:nvGrpSpPr>
+      <p:grpSpPr>
+        <a:xfrm>
+          <a:off x="0" y="0"/>
+          <a:ext cx="0" cy="0"/>
+          <a:chOff x="0" y="0"/>
+          <a:chExt cx="0" cy="0"/>
+        </a:xfrm>
+      </p:grpSpPr>
+      <p:sp>
+        <p:nvSpPr>
+          <p:cNvPr id="2" name="Title 1">
+            <a:extLst>
+              <a:ext uri="{FF2B5EF4-FFF2-40B4-BE49-F238E27FC236}">
+                <a16:creationId xmlns:a16="http://schemas.microsoft.com/office/drawing/2014/main" id="{E983946B-8F15-4BE2-B39C-CF90B4293FEE}"/>
+              </a:ext>
+            </a:extLst>
+          </p:cNvPr>
+          <p:cNvSpPr>
+            <a:spLocks noGrp="1"/>
+          </p:cNvSpPr>
+          <p:nvPr>
+            <p:ph type="title"/>
+          </p:nvPr>
+        </p:nvSpPr>
+        <p:spPr/>
+        <p:txBody>
+          <a:bodyPr/>
+          <a:lstStyle/>
+          <a:p>
+            <a:r>
+              <a:rPr lang="en-US" dirty="0"/>
+              <a:t>We used  </a:t>
+            </a:r>
+          </a:p>
+        </p:txBody>
+      </p:sp>
+      <p:pic>
+        <p:nvPicPr>
+          <p:cNvPr id="4" name="Content Placeholder 3">
+            <a:extLst>
+              <a:ext uri="{FF2B5EF4-FFF2-40B4-BE49-F238E27FC236}">
+                <a16:creationId xmlns:a16="http://schemas.microsoft.com/office/drawing/2014/main" id="{8E5A79C5-C511-4B70-80AE-1ACD32A6D2E7}"/>
+              </a:ext>
+            </a:extLst>
+          </p:cNvPr>
+          <p:cNvPicPr>
+            <a:picLocks noGrp="1" noChangeAspect="1"/>
+          </p:cNvPicPr>
+          <p:nvPr>
+            <p:ph idx="1"/>
+          </p:nvPr>
+        </p:nvPicPr>
+        <p:blipFill>
+          <a:blip r:embed="rId3"/>
+          <a:stretch>
+            <a:fillRect/>
+          </a:stretch>
+        </p:blipFill>
+        <p:spPr>
+          <a:xfrm>
+            <a:off x="779477" y="1690688"/>
+            <a:ext cx="10515600" cy="4278669"/>
+          </a:xfrm>
+          <a:prstGeom prst="rect">
+            <a:avLst/>
+          </a:prstGeom>
+        </p:spPr>
+      </p:pic>
+      <p:pic>
+        <p:nvPicPr>
+          <p:cNvPr id="5" name="Picture 4">
+            <a:extLst>
+              <a:ext uri="{FF2B5EF4-FFF2-40B4-BE49-F238E27FC236}">
+                <a16:creationId xmlns:a16="http://schemas.microsoft.com/office/drawing/2014/main" id="{B3B30B64-54E5-447A-AAFE-DE9CDC158028}"/>
+              </a:ext>
+            </a:extLst>
+          </p:cNvPr>
+          <p:cNvPicPr>
+            <a:picLocks noChangeAspect="1"/>
+          </p:cNvPicPr>
+          <p:nvPr/>
+        </p:nvPicPr>
+        <p:blipFill>
+          <a:blip r:embed="rId4"/>
+          <a:stretch>
+            <a:fillRect/>
+          </a:stretch>
+        </p:blipFill>
+        <p:spPr>
+          <a:xfrm>
+            <a:off x="3064430" y="299223"/>
+            <a:ext cx="1811387" cy="1178839"/>
+          </a:xfrm>
+          <a:prstGeom prst="rect">
+            <a:avLst/>
+          </a:prstGeom>
+        </p:spPr>
+      </p:pic>
+    </p:spTree>
+    <p:extLst>
+      <p:ext uri="{BB962C8B-B14F-4D97-AF65-F5344CB8AC3E}">
+        <p14:creationId xmlns:p14="http://schemas.microsoft.com/office/powerpoint/2010/main" val="1887371778"/>
+      </p:ext>
+    </p:extLst>
+  </p:cSld>
+  <p:clrMapOvr>
+    <a:masterClrMapping/>
+  </p:clrMapOvr>
+</p:sld>
+</file>
+
 <file path=ppt/slides/slide7.xml><?xml version="1.0" encoding="utf-8"?>
 <p:sld xmlns:a="http://schemas.openxmlformats.org/drawingml/2006/main" xmlns:r="http://schemas.openxmlformats.org/officeDocument/2006/relationships" xmlns:p="http://schemas.openxmlformats.org/presentationml/2006/main">
   <p:cSld>
@@ -6488,10 +7166,9 @@
           <a:bodyPr/>
           <a:lstStyle/>
           <a:p>
-            <a:pPr algn="ctr"/>
             <a:r>
               <a:rPr lang="en-US" dirty="0"/>
-              <a:t>We used              </a:t>
+              <a:t>We changed direction</a:t>
             </a:r>
           </a:p>
         </p:txBody>
@@ -6522,36 +7199,6 @@
           <a:xfrm>
             <a:off x="588102" y="2080591"/>
             <a:ext cx="10830730" cy="3776870"/>
-          </a:xfrm>
-          <a:prstGeom prst="rect">
-            <a:avLst/>
-          </a:prstGeom>
-        </p:spPr>
-      </p:pic>
-      <p:pic>
-        <p:nvPicPr>
-          <p:cNvPr id="4" name="Picture 3">
-            <a:extLst>
-              <a:ext uri="{FF2B5EF4-FFF2-40B4-BE49-F238E27FC236}">
-                <a16:creationId xmlns:a16="http://schemas.microsoft.com/office/drawing/2014/main" id="{E46D6892-90DD-4277-8132-CE2BDB881058}"/>
-              </a:ext>
-            </a:extLst>
-          </p:cNvPr>
-          <p:cNvPicPr>
-            <a:picLocks noChangeAspect="1"/>
-          </p:cNvPicPr>
-          <p:nvPr/>
-        </p:nvPicPr>
-        <p:blipFill>
-          <a:blip r:embed="rId4"/>
-          <a:stretch>
-            <a:fillRect/>
-          </a:stretch>
-        </p:blipFill>
-        <p:spPr>
-          <a:xfrm>
-            <a:off x="7121525" y="365125"/>
-            <a:ext cx="1811387" cy="1178839"/>
           </a:xfrm>
           <a:prstGeom prst="rect">
             <a:avLst/>
@@ -6750,10 +7397,10 @@
       </p:sp>
       <p:pic>
         <p:nvPicPr>
-          <p:cNvPr id="7" name="Content Placeholder 6">
-            <a:extLst>
-              <a:ext uri="{FF2B5EF4-FFF2-40B4-BE49-F238E27FC236}">
-                <a16:creationId xmlns:a16="http://schemas.microsoft.com/office/drawing/2014/main" id="{1131FAE9-E89C-4359-9EAB-D24E1937028E}"/>
+          <p:cNvPr id="5" name="Content Placeholder 4">
+            <a:extLst>
+              <a:ext uri="{FF2B5EF4-FFF2-40B4-BE49-F238E27FC236}">
+                <a16:creationId xmlns:a16="http://schemas.microsoft.com/office/drawing/2014/main" id="{EA29BE49-D903-45B5-97DE-91888A47A525}"/>
               </a:ext>
             </a:extLst>
           </p:cNvPr>
@@ -6772,8 +7419,8 @@
         </p:blipFill>
         <p:spPr>
           <a:xfrm>
-            <a:off x="838200" y="1841159"/>
-            <a:ext cx="10873658" cy="4167755"/>
+            <a:off x="1425251" y="1625374"/>
+            <a:ext cx="9341498" cy="5053122"/>
           </a:xfrm>
           <a:prstGeom prst="rect">
             <a:avLst/>

</xml_diff>

<commit_message>
making some changes to the notes
</commit_message>
<xml_diff>
--- a/Project 1 presentation (1).pptx
+++ b/Project 1 presentation (1).pptx
@@ -233,7 +233,7 @@
           <a:p>
             <a:fld id="{F21BFEBA-444E-4D21-BCF8-C3853CB4E1DB}" type="datetimeFigureOut">
               <a:rPr lang="en-US" smtClean="0"/>
-              <a:t>2/4/2020</a:t>
+              <a:t>2/5/2020</a:t>
             </a:fld>
             <a:endParaRPr lang="en-US"/>
           </a:p>
@@ -775,7 +775,7 @@
             </a:pPr>
             <a:r>
               <a:rPr lang="en-US" dirty="0"/>
-              <a:t>We reach out to Multnomah County for Health inspection data</a:t>
+              <a:t>This is our CSV from Multnomah County</a:t>
             </a:r>
           </a:p>
           <a:p>
@@ -785,7 +785,7 @@
             </a:pPr>
             <a:r>
               <a:rPr lang="en-US" dirty="0"/>
-              <a:t>Got some info from the County via a CSV file</a:t>
+              <a:t>Made into a data frame</a:t>
             </a:r>
           </a:p>
           <a:p>
@@ -795,7 +795,17 @@
             </a:pPr>
             <a:r>
               <a:rPr lang="en-US" dirty="0"/>
-              <a:t>We found 4500 restaurants in Multnomah County</a:t>
+              <a:t>Note : 3200 Rows</a:t>
+            </a:r>
+          </a:p>
+          <a:p>
+            <a:pPr marL="171450" indent="-171450">
+              <a:buFont typeface="Arial" panose="020B0604020202020204" pitchFamily="34" charset="0"/>
+              <a:buChar char="•"/>
+            </a:pPr>
+            <a:r>
+              <a:rPr lang="en-US" dirty="0"/>
+              <a:t>Painstakingly provided to us by Christian</a:t>
             </a:r>
           </a:p>
         </p:txBody>
@@ -886,7 +896,7 @@
             </a:pPr>
             <a:r>
               <a:rPr lang="en-US" dirty="0"/>
-              <a:t>Used the API to find additional information</a:t>
+              <a:t>Made room for data we get from API via making new columns</a:t>
             </a:r>
           </a:p>
           <a:p>
@@ -896,8 +906,21 @@
             </a:pPr>
             <a:r>
               <a:rPr lang="en-US" dirty="0"/>
-              <a:t>Used to populate information from API into our Data Frame.</a:t>
-            </a:r>
+              <a:t>We lost rows, down about 500 via </a:t>
+            </a:r>
+            <a:r>
+              <a:rPr lang="en-US" dirty="0" err="1"/>
+              <a:t>DropNA</a:t>
+            </a:r>
+            <a:r>
+              <a:rPr lang="en-US" dirty="0"/>
+              <a:t> and </a:t>
+            </a:r>
+            <a:r>
+              <a:rPr lang="en-US" dirty="0" err="1"/>
+              <a:t>DropDuplicates</a:t>
+            </a:r>
+            <a:endParaRPr lang="en-US" dirty="0"/>
           </a:p>
         </p:txBody>
       </p:sp>
@@ -997,7 +1020,7 @@
             </a:pPr>
             <a:r>
               <a:rPr lang="en-US" dirty="0"/>
-              <a:t>Found the name might be a better choice </a:t>
+              <a:t>Was returning Erroneous Data so we had to pivot</a:t>
             </a:r>
           </a:p>
           <a:p>
@@ -1091,7 +1114,17 @@
             </a:pPr>
             <a:r>
               <a:rPr lang="en-US" dirty="0"/>
-              <a:t>Our results worked</a:t>
+              <a:t>Another Example of an API call after using different parameters</a:t>
+            </a:r>
+          </a:p>
+          <a:p>
+            <a:pPr marL="628650" lvl="1" indent="-171450">
+              <a:buFont typeface="Arial" panose="020B0604020202020204" pitchFamily="34" charset="0"/>
+              <a:buChar char="•"/>
+            </a:pPr>
+            <a:r>
+              <a:rPr lang="en-US" dirty="0"/>
+              <a:t>Which I will explain in the next slide</a:t>
             </a:r>
           </a:p>
         </p:txBody>
@@ -1133,6 +1166,319 @@
 </file>
 
 <file path=ppt/notesSlides/notesSlide7.xml><?xml version="1.0" encoding="utf-8"?>
+<p:notes xmlns:a="http://schemas.openxmlformats.org/drawingml/2006/main" xmlns:r="http://schemas.openxmlformats.org/officeDocument/2006/relationships" xmlns:p="http://schemas.openxmlformats.org/presentationml/2006/main">
+  <p:cSld>
+    <p:spTree>
+      <p:nvGrpSpPr>
+        <p:cNvPr id="1" name=""/>
+        <p:cNvGrpSpPr/>
+        <p:nvPr/>
+      </p:nvGrpSpPr>
+      <p:grpSpPr>
+        <a:xfrm>
+          <a:off x="0" y="0"/>
+          <a:ext cx="0" cy="0"/>
+          <a:chOff x="0" y="0"/>
+          <a:chExt cx="0" cy="0"/>
+        </a:xfrm>
+      </p:grpSpPr>
+      <p:sp>
+        <p:nvSpPr>
+          <p:cNvPr id="2" name="Slide Image Placeholder 1"/>
+          <p:cNvSpPr>
+            <a:spLocks noGrp="1" noRot="1" noChangeAspect="1"/>
+          </p:cNvSpPr>
+          <p:nvPr>
+            <p:ph type="sldImg"/>
+          </p:nvPr>
+        </p:nvSpPr>
+        <p:spPr/>
+      </p:sp>
+      <p:sp>
+        <p:nvSpPr>
+          <p:cNvPr id="3" name="Notes Placeholder 2"/>
+          <p:cNvSpPr>
+            <a:spLocks noGrp="1"/>
+          </p:cNvSpPr>
+          <p:nvPr>
+            <p:ph type="body" idx="1"/>
+          </p:nvPr>
+        </p:nvSpPr>
+        <p:spPr/>
+        <p:txBody>
+          <a:bodyPr/>
+          <a:lstStyle/>
+          <a:p>
+            <a:pPr marL="171450" indent="-171450">
+              <a:buFont typeface="Arial" panose="020B0604020202020204" pitchFamily="34" charset="0"/>
+              <a:buChar char="•"/>
+            </a:pPr>
+            <a:r>
+              <a:rPr lang="en-US" dirty="0"/>
+              <a:t>Used Portland for the Location Parameters</a:t>
+            </a:r>
+          </a:p>
+          <a:p>
+            <a:pPr marL="171450" indent="-171450">
+              <a:buFont typeface="Arial" panose="020B0604020202020204" pitchFamily="34" charset="0"/>
+              <a:buChar char="•"/>
+            </a:pPr>
+            <a:r>
+              <a:rPr lang="en-US" dirty="0"/>
+              <a:t>Used </a:t>
+            </a:r>
+            <a:r>
+              <a:rPr lang="en-US" dirty="0" err="1"/>
+              <a:t>iterrows</a:t>
+            </a:r>
+            <a:r>
+              <a:rPr lang="en-US" dirty="0"/>
+              <a:t> to gather and store information in our </a:t>
+            </a:r>
+            <a:r>
+              <a:rPr lang="en-US" dirty="0" err="1"/>
+              <a:t>dataframe</a:t>
+            </a:r>
+            <a:endParaRPr lang="en-US" dirty="0"/>
+          </a:p>
+          <a:p>
+            <a:pPr marL="171450" indent="-171450">
+              <a:buFont typeface="Arial" panose="020B0604020202020204" pitchFamily="34" charset="0"/>
+              <a:buChar char="•"/>
+            </a:pPr>
+            <a:r>
+              <a:rPr lang="en-US" dirty="0"/>
+              <a:t>In </a:t>
+            </a:r>
+            <a:r>
+              <a:rPr lang="en-US" dirty="0" err="1"/>
+              <a:t>combinaton</a:t>
+            </a:r>
+            <a:r>
+              <a:rPr lang="en-US" dirty="0"/>
+              <a:t> with the location parameter we used the terms parameter</a:t>
+            </a:r>
+          </a:p>
+          <a:p>
+            <a:pPr marL="628650" lvl="1" indent="-171450">
+              <a:buFont typeface="Arial" panose="020B0604020202020204" pitchFamily="34" charset="0"/>
+              <a:buChar char="•"/>
+            </a:pPr>
+            <a:r>
+              <a:rPr lang="en-US" dirty="0"/>
+              <a:t>Got us much more accurate results</a:t>
+            </a:r>
+          </a:p>
+          <a:p>
+            <a:pPr marL="171450" lvl="0" indent="-171450">
+              <a:buFont typeface="Arial" panose="020B0604020202020204" pitchFamily="34" charset="0"/>
+              <a:buChar char="•"/>
+            </a:pPr>
+            <a:r>
+              <a:rPr lang="en-US" dirty="0"/>
+              <a:t>Used Try Except to store information in data frame from the API</a:t>
+            </a:r>
+          </a:p>
+          <a:p>
+            <a:pPr marL="628650" lvl="1" indent="-171450">
+              <a:buFont typeface="Arial" panose="020B0604020202020204" pitchFamily="34" charset="0"/>
+              <a:buChar char="•"/>
+            </a:pPr>
+            <a:r>
+              <a:rPr lang="en-US" dirty="0"/>
+              <a:t>Except skipped rows where we could not get information from the API</a:t>
+            </a:r>
+          </a:p>
+          <a:p>
+            <a:pPr marL="628650" lvl="1" indent="-171450">
+              <a:buFont typeface="Arial" panose="020B0604020202020204" pitchFamily="34" charset="0"/>
+              <a:buChar char="•"/>
+            </a:pPr>
+            <a:endParaRPr lang="en-US" dirty="0"/>
+          </a:p>
+        </p:txBody>
+      </p:sp>
+      <p:sp>
+        <p:nvSpPr>
+          <p:cNvPr id="4" name="Slide Number Placeholder 3"/>
+          <p:cNvSpPr>
+            <a:spLocks noGrp="1"/>
+          </p:cNvSpPr>
+          <p:nvPr>
+            <p:ph type="sldNum" sz="quarter" idx="5"/>
+          </p:nvPr>
+        </p:nvSpPr>
+        <p:spPr/>
+        <p:txBody>
+          <a:bodyPr/>
+          <a:lstStyle/>
+          <a:p>
+            <a:fld id="{C60EE7C2-D695-4AAA-9E42-80CCB42FD659}" type="slidenum">
+              <a:rPr lang="en-US" smtClean="0"/>
+              <a:t>8</a:t>
+            </a:fld>
+            <a:endParaRPr lang="en-US"/>
+          </a:p>
+        </p:txBody>
+      </p:sp>
+    </p:spTree>
+    <p:extLst>
+      <p:ext uri="{BB962C8B-B14F-4D97-AF65-F5344CB8AC3E}">
+        <p14:creationId xmlns:p14="http://schemas.microsoft.com/office/powerpoint/2010/main" val="2754635337"/>
+      </p:ext>
+    </p:extLst>
+  </p:cSld>
+  <p:clrMapOvr>
+    <a:masterClrMapping/>
+  </p:clrMapOvr>
+</p:notes>
+</file>
+
+<file path=ppt/notesSlides/notesSlide8.xml><?xml version="1.0" encoding="utf-8"?>
+<p:notes xmlns:a="http://schemas.openxmlformats.org/drawingml/2006/main" xmlns:r="http://schemas.openxmlformats.org/officeDocument/2006/relationships" xmlns:p="http://schemas.openxmlformats.org/presentationml/2006/main">
+  <p:cSld>
+    <p:spTree>
+      <p:nvGrpSpPr>
+        <p:cNvPr id="1" name=""/>
+        <p:cNvGrpSpPr/>
+        <p:nvPr/>
+      </p:nvGrpSpPr>
+      <p:grpSpPr>
+        <a:xfrm>
+          <a:off x="0" y="0"/>
+          <a:ext cx="0" cy="0"/>
+          <a:chOff x="0" y="0"/>
+          <a:chExt cx="0" cy="0"/>
+        </a:xfrm>
+      </p:grpSpPr>
+      <p:sp>
+        <p:nvSpPr>
+          <p:cNvPr id="2" name="Slide Image Placeholder 1"/>
+          <p:cNvSpPr>
+            <a:spLocks noGrp="1" noRot="1" noChangeAspect="1"/>
+          </p:cNvSpPr>
+          <p:nvPr>
+            <p:ph type="sldImg"/>
+          </p:nvPr>
+        </p:nvSpPr>
+        <p:spPr/>
+      </p:sp>
+      <p:sp>
+        <p:nvSpPr>
+          <p:cNvPr id="3" name="Notes Placeholder 2"/>
+          <p:cNvSpPr>
+            <a:spLocks noGrp="1"/>
+          </p:cNvSpPr>
+          <p:nvPr>
+            <p:ph type="body" idx="1"/>
+          </p:nvPr>
+        </p:nvSpPr>
+        <p:spPr/>
+        <p:txBody>
+          <a:bodyPr/>
+          <a:lstStyle/>
+          <a:p>
+            <a:pPr marL="171450" indent="-171450">
+              <a:buFont typeface="Arial" panose="020B0604020202020204" pitchFamily="34" charset="0"/>
+              <a:buChar char="•"/>
+            </a:pPr>
+            <a:r>
+              <a:rPr lang="en-US" dirty="0"/>
+              <a:t>Cleaned up the </a:t>
+            </a:r>
+            <a:r>
+              <a:rPr lang="en-US" dirty="0" err="1"/>
+              <a:t>DataFrame</a:t>
+            </a:r>
+            <a:r>
+              <a:rPr lang="en-US" dirty="0"/>
+              <a:t> a bit</a:t>
+            </a:r>
+          </a:p>
+          <a:p>
+            <a:pPr marL="628650" lvl="1" indent="-171450">
+              <a:buFont typeface="Arial" panose="020B0604020202020204" pitchFamily="34" charset="0"/>
+              <a:buChar char="•"/>
+            </a:pPr>
+            <a:r>
+              <a:rPr lang="en-US" dirty="0"/>
+              <a:t>Deleted Columns </a:t>
+            </a:r>
+          </a:p>
+          <a:p>
+            <a:pPr marL="628650" lvl="1" indent="-171450">
+              <a:buFont typeface="Arial" panose="020B0604020202020204" pitchFamily="34" charset="0"/>
+              <a:buChar char="•"/>
+            </a:pPr>
+            <a:r>
+              <a:rPr lang="en-US" dirty="0"/>
+              <a:t>Renamed others</a:t>
+            </a:r>
+          </a:p>
+          <a:p>
+            <a:pPr marL="628650" lvl="1" indent="-171450">
+              <a:buFont typeface="Arial" panose="020B0604020202020204" pitchFamily="34" charset="0"/>
+              <a:buChar char="•"/>
+            </a:pPr>
+            <a:r>
+              <a:rPr lang="en-US" dirty="0"/>
+              <a:t>Dropped Rows that were skipped in the for loop</a:t>
+            </a:r>
+          </a:p>
+          <a:p>
+            <a:pPr marL="171450" lvl="0" indent="-171450">
+              <a:buFont typeface="Arial" panose="020B0604020202020204" pitchFamily="34" charset="0"/>
+              <a:buChar char="•"/>
+            </a:pPr>
+            <a:r>
+              <a:rPr lang="en-US" dirty="0"/>
+              <a:t>Next is our Resident Visualization and Analysis Correspondent, Nancy, to tell you a little bit about </a:t>
+            </a:r>
+            <a:r>
+              <a:rPr lang="en-US"/>
+              <a:t>our findings</a:t>
+            </a:r>
+            <a:endParaRPr lang="en-US" dirty="0"/>
+          </a:p>
+        </p:txBody>
+      </p:sp>
+      <p:sp>
+        <p:nvSpPr>
+          <p:cNvPr id="4" name="Slide Number Placeholder 3"/>
+          <p:cNvSpPr>
+            <a:spLocks noGrp="1"/>
+          </p:cNvSpPr>
+          <p:nvPr>
+            <p:ph type="sldNum" sz="quarter" idx="5"/>
+          </p:nvPr>
+        </p:nvSpPr>
+        <p:spPr/>
+        <p:txBody>
+          <a:bodyPr/>
+          <a:lstStyle/>
+          <a:p>
+            <a:fld id="{C60EE7C2-D695-4AAA-9E42-80CCB42FD659}" type="slidenum">
+              <a:rPr lang="en-US" smtClean="0"/>
+              <a:t>10</a:t>
+            </a:fld>
+            <a:endParaRPr lang="en-US"/>
+          </a:p>
+        </p:txBody>
+      </p:sp>
+    </p:spTree>
+    <p:extLst>
+      <p:ext uri="{BB962C8B-B14F-4D97-AF65-F5344CB8AC3E}">
+        <p14:creationId xmlns:p14="http://schemas.microsoft.com/office/powerpoint/2010/main" val="3257382007"/>
+      </p:ext>
+    </p:extLst>
+  </p:cSld>
+  <p:clrMapOvr>
+    <a:masterClrMapping/>
+  </p:clrMapOvr>
+</p:notes>
+</file>
+
+<file path=ppt/notesSlides/notesSlide9.xml><?xml version="1.0" encoding="utf-8"?>
 <p:notes xmlns:a="http://schemas.openxmlformats.org/drawingml/2006/main" xmlns:r="http://schemas.openxmlformats.org/officeDocument/2006/relationships" xmlns:p="http://schemas.openxmlformats.org/presentationml/2006/main">
   <p:cSld>
     <p:spTree>
@@ -1429,7 +1775,7 @@
           <a:p>
             <a:fld id="{4112E8E4-3066-4D41-B9D9-DFF0E291FC3A}" type="datetimeFigureOut">
               <a:rPr lang="en-US" smtClean="0"/>
-              <a:t>2/4/2020</a:t>
+              <a:t>2/5/2020</a:t>
             </a:fld>
             <a:endParaRPr lang="en-US"/>
           </a:p>
@@ -1627,7 +1973,7 @@
           <a:p>
             <a:fld id="{4112E8E4-3066-4D41-B9D9-DFF0E291FC3A}" type="datetimeFigureOut">
               <a:rPr lang="en-US" smtClean="0"/>
-              <a:t>2/4/2020</a:t>
+              <a:t>2/5/2020</a:t>
             </a:fld>
             <a:endParaRPr lang="en-US"/>
           </a:p>
@@ -1835,7 +2181,7 @@
           <a:p>
             <a:fld id="{4112E8E4-3066-4D41-B9D9-DFF0E291FC3A}" type="datetimeFigureOut">
               <a:rPr lang="en-US" smtClean="0"/>
-              <a:t>2/4/2020</a:t>
+              <a:t>2/5/2020</a:t>
             </a:fld>
             <a:endParaRPr lang="en-US"/>
           </a:p>
@@ -2033,7 +2379,7 @@
           <a:p>
             <a:fld id="{4112E8E4-3066-4D41-B9D9-DFF0E291FC3A}" type="datetimeFigureOut">
               <a:rPr lang="en-US" smtClean="0"/>
-              <a:t>2/4/2020</a:t>
+              <a:t>2/5/2020</a:t>
             </a:fld>
             <a:endParaRPr lang="en-US"/>
           </a:p>
@@ -2308,7 +2654,7 @@
           <a:p>
             <a:fld id="{4112E8E4-3066-4D41-B9D9-DFF0E291FC3A}" type="datetimeFigureOut">
               <a:rPr lang="en-US" smtClean="0"/>
-              <a:t>2/4/2020</a:t>
+              <a:t>2/5/2020</a:t>
             </a:fld>
             <a:endParaRPr lang="en-US"/>
           </a:p>
@@ -2573,7 +2919,7 @@
           <a:p>
             <a:fld id="{4112E8E4-3066-4D41-B9D9-DFF0E291FC3A}" type="datetimeFigureOut">
               <a:rPr lang="en-US" smtClean="0"/>
-              <a:t>2/4/2020</a:t>
+              <a:t>2/5/2020</a:t>
             </a:fld>
             <a:endParaRPr lang="en-US"/>
           </a:p>
@@ -2985,7 +3331,7 @@
           <a:p>
             <a:fld id="{4112E8E4-3066-4D41-B9D9-DFF0E291FC3A}" type="datetimeFigureOut">
               <a:rPr lang="en-US" smtClean="0"/>
-              <a:t>2/4/2020</a:t>
+              <a:t>2/5/2020</a:t>
             </a:fld>
             <a:endParaRPr lang="en-US"/>
           </a:p>
@@ -3126,7 +3472,7 @@
           <a:p>
             <a:fld id="{4112E8E4-3066-4D41-B9D9-DFF0E291FC3A}" type="datetimeFigureOut">
               <a:rPr lang="en-US" smtClean="0"/>
-              <a:t>2/4/2020</a:t>
+              <a:t>2/5/2020</a:t>
             </a:fld>
             <a:endParaRPr lang="en-US"/>
           </a:p>
@@ -3239,7 +3585,7 @@
           <a:p>
             <a:fld id="{4112E8E4-3066-4D41-B9D9-DFF0E291FC3A}" type="datetimeFigureOut">
               <a:rPr lang="en-US" smtClean="0"/>
-              <a:t>2/4/2020</a:t>
+              <a:t>2/5/2020</a:t>
             </a:fld>
             <a:endParaRPr lang="en-US"/>
           </a:p>
@@ -3550,7 +3896,7 @@
           <a:p>
             <a:fld id="{4112E8E4-3066-4D41-B9D9-DFF0E291FC3A}" type="datetimeFigureOut">
               <a:rPr lang="en-US" smtClean="0"/>
-              <a:t>2/4/2020</a:t>
+              <a:t>2/5/2020</a:t>
             </a:fld>
             <a:endParaRPr lang="en-US"/>
           </a:p>
@@ -3838,7 +4184,7 @@
           <a:p>
             <a:fld id="{4112E8E4-3066-4D41-B9D9-DFF0E291FC3A}" type="datetimeFigureOut">
               <a:rPr lang="en-US" smtClean="0"/>
-              <a:t>2/4/2020</a:t>
+              <a:t>2/5/2020</a:t>
             </a:fld>
             <a:endParaRPr lang="en-US"/>
           </a:p>
@@ -4103,7 +4449,7 @@
           <a:p>
             <a:fld id="{4112E8E4-3066-4D41-B9D9-DFF0E291FC3A}" type="datetimeFigureOut">
               <a:rPr lang="en-US" smtClean="0"/>
-              <a:t>2/4/2020</a:t>
+              <a:t>2/5/2020</a:t>
             </a:fld>
             <a:endParaRPr lang="en-US"/>
           </a:p>
@@ -4645,12 +4991,20 @@
               </a:spcBef>
             </a:pPr>
             <a:r>
+              <a:rPr lang="en-US" sz="2600">
+                <a:latin typeface="Calibri" panose="020F0502020204030204" pitchFamily="34" charset="0"/>
+                <a:ea typeface="Calibri" panose="020F0502020204030204" pitchFamily="34" charset="0"/>
+                <a:cs typeface="Times New Roman" panose="02020603050405020304" pitchFamily="18" charset="0"/>
+              </a:rPr>
+              <a:t>Devin </a:t>
+            </a:r>
+            <a:r>
               <a:rPr lang="en-US" sz="2600" dirty="0">
                 <a:latin typeface="Calibri" panose="020F0502020204030204" pitchFamily="34" charset="0"/>
                 <a:ea typeface="Calibri" panose="020F0502020204030204" pitchFamily="34" charset="0"/>
                 <a:cs typeface="Times New Roman" panose="02020603050405020304" pitchFamily="18" charset="0"/>
               </a:rPr>
-              <a:t>Delvin Milligan</a:t>
+              <a:t>Milligan</a:t>
             </a:r>
           </a:p>
           <a:p>
@@ -4764,7 +5118,7 @@
           <p:nvPr/>
         </p:nvPicPr>
         <p:blipFill>
-          <a:blip r:embed="rId2"/>
+          <a:blip r:embed="rId3"/>
           <a:stretch>
             <a:fillRect/>
           </a:stretch>
@@ -7322,7 +7676,7 @@
           <p:nvPr/>
         </p:nvPicPr>
         <p:blipFill>
-          <a:blip r:embed="rId2"/>
+          <a:blip r:embed="rId3"/>
           <a:stretch>
             <a:fillRect/>
           </a:stretch>

</xml_diff>

<commit_message>
final updated last time presentation
</commit_message>
<xml_diff>
--- a/Project 1 presentation (1).pptx
+++ b/Project 1 presentation (1).pptx
@@ -5,34 +5,35 @@
     <p:sldMasterId id="2147483648" r:id="rId1"/>
   </p:sldMasterIdLst>
   <p:notesMasterIdLst>
-    <p:notesMasterId r:id="rId27"/>
+    <p:notesMasterId r:id="rId28"/>
   </p:notesMasterIdLst>
   <p:sldIdLst>
     <p:sldId id="256" r:id="rId2"/>
     <p:sldId id="258" r:id="rId3"/>
-    <p:sldId id="271" r:id="rId4"/>
-    <p:sldId id="272" r:id="rId5"/>
-    <p:sldId id="273" r:id="rId6"/>
-    <p:sldId id="274" r:id="rId7"/>
-    <p:sldId id="278" r:id="rId8"/>
-    <p:sldId id="265" r:id="rId9"/>
-    <p:sldId id="275" r:id="rId10"/>
-    <p:sldId id="276" r:id="rId11"/>
-    <p:sldId id="282" r:id="rId12"/>
-    <p:sldId id="279" r:id="rId13"/>
-    <p:sldId id="286" r:id="rId14"/>
-    <p:sldId id="280" r:id="rId15"/>
-    <p:sldId id="285" r:id="rId16"/>
-    <p:sldId id="283" r:id="rId17"/>
-    <p:sldId id="284" r:id="rId18"/>
-    <p:sldId id="261" r:id="rId19"/>
-    <p:sldId id="288" r:id="rId20"/>
-    <p:sldId id="287" r:id="rId21"/>
-    <p:sldId id="267" r:id="rId22"/>
-    <p:sldId id="268" r:id="rId23"/>
-    <p:sldId id="269" r:id="rId24"/>
-    <p:sldId id="262" r:id="rId25"/>
-    <p:sldId id="270" r:id="rId26"/>
+    <p:sldId id="290" r:id="rId4"/>
+    <p:sldId id="271" r:id="rId5"/>
+    <p:sldId id="272" r:id="rId6"/>
+    <p:sldId id="273" r:id="rId7"/>
+    <p:sldId id="274" r:id="rId8"/>
+    <p:sldId id="278" r:id="rId9"/>
+    <p:sldId id="265" r:id="rId10"/>
+    <p:sldId id="275" r:id="rId11"/>
+    <p:sldId id="276" r:id="rId12"/>
+    <p:sldId id="282" r:id="rId13"/>
+    <p:sldId id="279" r:id="rId14"/>
+    <p:sldId id="286" r:id="rId15"/>
+    <p:sldId id="280" r:id="rId16"/>
+    <p:sldId id="285" r:id="rId17"/>
+    <p:sldId id="283" r:id="rId18"/>
+    <p:sldId id="284" r:id="rId19"/>
+    <p:sldId id="261" r:id="rId20"/>
+    <p:sldId id="288" r:id="rId21"/>
+    <p:sldId id="287" r:id="rId22"/>
+    <p:sldId id="267" r:id="rId23"/>
+    <p:sldId id="268" r:id="rId24"/>
+    <p:sldId id="269" r:id="rId25"/>
+    <p:sldId id="262" r:id="rId26"/>
+    <p:sldId id="270" r:id="rId27"/>
   </p:sldIdLst>
   <p:sldSz cx="12192000" cy="6858000"/>
   <p:notesSz cx="6858000" cy="9144000"/>
@@ -706,7 +707,7 @@
           <a:p>
             <a:fld id="{C60EE7C2-D695-4AAA-9E42-80CCB42FD659}" type="slidenum">
               <a:rPr lang="en-US" smtClean="0"/>
-              <a:t>3</a:t>
+              <a:t>4</a:t>
             </a:fld>
             <a:endParaRPr lang="en-US"/>
           </a:p>
@@ -827,7 +828,7 @@
           <a:p>
             <a:fld id="{C60EE7C2-D695-4AAA-9E42-80CCB42FD659}" type="slidenum">
               <a:rPr lang="en-US" smtClean="0"/>
-              <a:t>4</a:t>
+              <a:t>5</a:t>
             </a:fld>
             <a:endParaRPr lang="en-US"/>
           </a:p>
@@ -941,7 +942,7 @@
           <a:p>
             <a:fld id="{C60EE7C2-D695-4AAA-9E42-80CCB42FD659}" type="slidenum">
               <a:rPr lang="en-US" smtClean="0"/>
-              <a:t>5</a:t>
+              <a:t>6</a:t>
             </a:fld>
             <a:endParaRPr lang="en-US"/>
           </a:p>
@@ -1045,7 +1046,7 @@
           <a:p>
             <a:fld id="{C60EE7C2-D695-4AAA-9E42-80CCB42FD659}" type="slidenum">
               <a:rPr lang="en-US" smtClean="0"/>
-              <a:t>6</a:t>
+              <a:t>7</a:t>
             </a:fld>
             <a:endParaRPr lang="en-US"/>
           </a:p>
@@ -1146,7 +1147,7 @@
           <a:p>
             <a:fld id="{C60EE7C2-D695-4AAA-9E42-80CCB42FD659}" type="slidenum">
               <a:rPr lang="en-US" smtClean="0"/>
-              <a:t>7</a:t>
+              <a:t>8</a:t>
             </a:fld>
             <a:endParaRPr lang="en-US"/>
           </a:p>
@@ -1315,7 +1316,7 @@
           <a:p>
             <a:fld id="{C60EE7C2-D695-4AAA-9E42-80CCB42FD659}" type="slidenum">
               <a:rPr lang="en-US" smtClean="0"/>
-              <a:t>8</a:t>
+              <a:t>9</a:t>
             </a:fld>
             <a:endParaRPr lang="en-US"/>
           </a:p>
@@ -1459,7 +1460,7 @@
           <a:p>
             <a:fld id="{C60EE7C2-D695-4AAA-9E42-80CCB42FD659}" type="slidenum">
               <a:rPr lang="en-US" smtClean="0"/>
-              <a:t>10</a:t>
+              <a:t>11</a:t>
             </a:fld>
             <a:endParaRPr lang="en-US"/>
           </a:p>
@@ -1609,7 +1610,7 @@
           <a:p>
             <a:fld id="{C60EE7C2-D695-4AAA-9E42-80CCB42FD659}" type="slidenum">
               <a:rPr lang="en-US" smtClean="0"/>
-              <a:t>22</a:t>
+              <a:t>23</a:t>
             </a:fld>
             <a:endParaRPr lang="en-US"/>
           </a:p>
@@ -4885,14 +4886,14 @@
         <p:spPr/>
         <p:txBody>
           <a:bodyPr>
-            <a:normAutofit fontScale="90000"/>
+            <a:normAutofit/>
           </a:bodyPr>
           <a:lstStyle/>
           <a:p>
             <a:pPr algn="l"/>
             <a:r>
               <a:rPr lang="en-US" dirty="0"/>
-              <a:t>Do more expensive restaurants have better health inspection scores?</a:t>
+              <a:t>Expensive restaurant and health inspections scores.</a:t>
             </a:r>
           </a:p>
         </p:txBody>
@@ -5059,6 +5060,96 @@
 </file>
 
 <file path=ppt/slides/slide10.xml><?xml version="1.0" encoding="utf-8"?>
+<p:sld xmlns:a="http://schemas.openxmlformats.org/drawingml/2006/main" xmlns:r="http://schemas.openxmlformats.org/officeDocument/2006/relationships" xmlns:p="http://schemas.openxmlformats.org/presentationml/2006/main">
+  <p:cSld>
+    <p:spTree>
+      <p:nvGrpSpPr>
+        <p:cNvPr id="1" name=""/>
+        <p:cNvGrpSpPr/>
+        <p:nvPr/>
+      </p:nvGrpSpPr>
+      <p:grpSpPr>
+        <a:xfrm>
+          <a:off x="0" y="0"/>
+          <a:ext cx="0" cy="0"/>
+          <a:chOff x="0" y="0"/>
+          <a:chExt cx="0" cy="0"/>
+        </a:xfrm>
+      </p:grpSpPr>
+      <p:sp>
+        <p:nvSpPr>
+          <p:cNvPr id="2" name="Title 1">
+            <a:extLst>
+              <a:ext uri="{FF2B5EF4-FFF2-40B4-BE49-F238E27FC236}">
+                <a16:creationId xmlns:a16="http://schemas.microsoft.com/office/drawing/2014/main" id="{955499BD-B941-4183-A602-AA8DF9B9C0FB}"/>
+              </a:ext>
+            </a:extLst>
+          </p:cNvPr>
+          <p:cNvSpPr>
+            <a:spLocks noGrp="1"/>
+          </p:cNvSpPr>
+          <p:nvPr>
+            <p:ph type="title"/>
+          </p:nvPr>
+        </p:nvSpPr>
+        <p:spPr/>
+        <p:txBody>
+          <a:bodyPr/>
+          <a:lstStyle/>
+          <a:p>
+            <a:r>
+              <a:rPr lang="en-US" dirty="0"/>
+              <a:t>We added some data to columns</a:t>
+            </a:r>
+          </a:p>
+        </p:txBody>
+      </p:sp>
+      <p:pic>
+        <p:nvPicPr>
+          <p:cNvPr id="5" name="Content Placeholder 4">
+            <a:extLst>
+              <a:ext uri="{FF2B5EF4-FFF2-40B4-BE49-F238E27FC236}">
+                <a16:creationId xmlns:a16="http://schemas.microsoft.com/office/drawing/2014/main" id="{EA29BE49-D903-45B5-97DE-91888A47A525}"/>
+              </a:ext>
+            </a:extLst>
+          </p:cNvPr>
+          <p:cNvPicPr>
+            <a:picLocks noGrp="1" noChangeAspect="1"/>
+          </p:cNvPicPr>
+          <p:nvPr>
+            <p:ph idx="1"/>
+          </p:nvPr>
+        </p:nvPicPr>
+        <p:blipFill>
+          <a:blip r:embed="rId2"/>
+          <a:stretch>
+            <a:fillRect/>
+          </a:stretch>
+        </p:blipFill>
+        <p:spPr>
+          <a:xfrm>
+            <a:off x="1425251" y="1625374"/>
+            <a:ext cx="9341498" cy="5053122"/>
+          </a:xfrm>
+          <a:prstGeom prst="rect">
+            <a:avLst/>
+          </a:prstGeom>
+        </p:spPr>
+      </p:pic>
+    </p:spTree>
+    <p:extLst>
+      <p:ext uri="{BB962C8B-B14F-4D97-AF65-F5344CB8AC3E}">
+        <p14:creationId xmlns:p14="http://schemas.microsoft.com/office/powerpoint/2010/main" val="1933645533"/>
+      </p:ext>
+    </p:extLst>
+  </p:cSld>
+  <p:clrMapOvr>
+    <a:masterClrMapping/>
+  </p:clrMapOvr>
+</p:sld>
+</file>
+
+<file path=ppt/slides/slide11.xml><?xml version="1.0" encoding="utf-8"?>
 <p:sld xmlns:a="http://schemas.openxmlformats.org/drawingml/2006/main" xmlns:r="http://schemas.openxmlformats.org/officeDocument/2006/relationships" xmlns:p="http://schemas.openxmlformats.org/presentationml/2006/main">
   <p:cSld>
     <p:spTree>
@@ -5146,7 +5237,7 @@
 </p:sld>
 </file>
 
-<file path=ppt/slides/slide11.xml><?xml version="1.0" encoding="utf-8"?>
+<file path=ppt/slides/slide12.xml><?xml version="1.0" encoding="utf-8"?>
 <p:sld xmlns:a="http://schemas.openxmlformats.org/drawingml/2006/main" xmlns:r="http://schemas.openxmlformats.org/officeDocument/2006/relationships" xmlns:p="http://schemas.openxmlformats.org/presentationml/2006/main">
   <p:cSld>
     <p:spTree>
@@ -5250,7 +5341,7 @@
 </p:sld>
 </file>
 
-<file path=ppt/slides/slide12.xml><?xml version="1.0" encoding="utf-8"?>
+<file path=ppt/slides/slide13.xml><?xml version="1.0" encoding="utf-8"?>
 <p:sld xmlns:a="http://schemas.openxmlformats.org/drawingml/2006/main" xmlns:r="http://schemas.openxmlformats.org/officeDocument/2006/relationships" xmlns:p="http://schemas.openxmlformats.org/presentationml/2006/main">
   <p:cSld>
     <p:spTree>
@@ -5316,7 +5407,7 @@
 </p:sld>
 </file>
 
-<file path=ppt/slides/slide13.xml><?xml version="1.0" encoding="utf-8"?>
+<file path=ppt/slides/slide14.xml><?xml version="1.0" encoding="utf-8"?>
 <p:sld xmlns:a="http://schemas.openxmlformats.org/drawingml/2006/main" xmlns:r="http://schemas.openxmlformats.org/officeDocument/2006/relationships" xmlns:p="http://schemas.openxmlformats.org/presentationml/2006/main">
   <p:cSld>
     <p:spTree>
@@ -5378,7 +5469,7 @@
 </p:sld>
 </file>
 
-<file path=ppt/slides/slide14.xml><?xml version="1.0" encoding="utf-8"?>
+<file path=ppt/slides/slide15.xml><?xml version="1.0" encoding="utf-8"?>
 <p:sld xmlns:a="http://schemas.openxmlformats.org/drawingml/2006/main" xmlns:r="http://schemas.openxmlformats.org/officeDocument/2006/relationships" xmlns:p="http://schemas.openxmlformats.org/presentationml/2006/main">
   <p:cSld>
     <p:spTree>
@@ -5516,7 +5607,7 @@
 </p:sld>
 </file>
 
-<file path=ppt/slides/slide15.xml><?xml version="1.0" encoding="utf-8"?>
+<file path=ppt/slides/slide16.xml><?xml version="1.0" encoding="utf-8"?>
 <p:sld xmlns:a="http://schemas.openxmlformats.org/drawingml/2006/main" xmlns:r="http://schemas.openxmlformats.org/officeDocument/2006/relationships" xmlns:p="http://schemas.openxmlformats.org/presentationml/2006/main">
   <p:cSld>
     <p:spTree>
@@ -5583,7 +5674,7 @@
 </p:sld>
 </file>
 
-<file path=ppt/slides/slide16.xml><?xml version="1.0" encoding="utf-8"?>
+<file path=ppt/slides/slide17.xml><?xml version="1.0" encoding="utf-8"?>
 <p:sld xmlns:a="http://schemas.openxmlformats.org/drawingml/2006/main" xmlns:r="http://schemas.openxmlformats.org/officeDocument/2006/relationships" xmlns:p="http://schemas.openxmlformats.org/presentationml/2006/main">
   <p:cSld>
     <p:spTree>
@@ -5810,7 +5901,7 @@
 </p:sld>
 </file>
 
-<file path=ppt/slides/slide17.xml><?xml version="1.0" encoding="utf-8"?>
+<file path=ppt/slides/slide18.xml><?xml version="1.0" encoding="utf-8"?>
 <p:sld xmlns:a="http://schemas.openxmlformats.org/drawingml/2006/main" xmlns:r="http://schemas.openxmlformats.org/officeDocument/2006/relationships" xmlns:p="http://schemas.openxmlformats.org/presentationml/2006/main">
   <p:cSld>
     <p:spTree>
@@ -5905,7 +5996,7 @@
 </p:sld>
 </file>
 
-<file path=ppt/slides/slide18.xml><?xml version="1.0" encoding="utf-8"?>
+<file path=ppt/slides/slide19.xml><?xml version="1.0" encoding="utf-8"?>
 <p:sld xmlns:a="http://schemas.openxmlformats.org/drawingml/2006/main" xmlns:r="http://schemas.openxmlformats.org/officeDocument/2006/relationships" xmlns:p="http://schemas.openxmlformats.org/presentationml/2006/main">
   <p:cSld>
     <p:spTree>
@@ -6142,7 +6233,108 @@
 </p:sld>
 </file>
 
-<file path=ppt/slides/slide19.xml><?xml version="1.0" encoding="utf-8"?>
+<file path=ppt/slides/slide2.xml><?xml version="1.0" encoding="utf-8"?>
+<p:sld xmlns:a="http://schemas.openxmlformats.org/drawingml/2006/main" xmlns:r="http://schemas.openxmlformats.org/officeDocument/2006/relationships" xmlns:p="http://schemas.openxmlformats.org/presentationml/2006/main">
+  <p:cSld>
+    <p:spTree>
+      <p:nvGrpSpPr>
+        <p:cNvPr id="1" name=""/>
+        <p:cNvGrpSpPr/>
+        <p:nvPr/>
+      </p:nvGrpSpPr>
+      <p:grpSpPr>
+        <a:xfrm>
+          <a:off x="0" y="0"/>
+          <a:ext cx="0" cy="0"/>
+          <a:chOff x="0" y="0"/>
+          <a:chExt cx="0" cy="0"/>
+        </a:xfrm>
+      </p:grpSpPr>
+      <p:sp>
+        <p:nvSpPr>
+          <p:cNvPr id="2" name="Title 1">
+            <a:extLst>
+              <a:ext uri="{FF2B5EF4-FFF2-40B4-BE49-F238E27FC236}">
+                <a16:creationId xmlns:a16="http://schemas.microsoft.com/office/drawing/2014/main" id="{EC497F1B-C30B-4F56-A9B5-0A85B7C3C219}"/>
+              </a:ext>
+            </a:extLst>
+          </p:cNvPr>
+          <p:cNvSpPr>
+            <a:spLocks noGrp="1"/>
+          </p:cNvSpPr>
+          <p:nvPr>
+            <p:ph type="title"/>
+          </p:nvPr>
+        </p:nvSpPr>
+        <p:spPr/>
+        <p:txBody>
+          <a:bodyPr/>
+          <a:lstStyle/>
+          <a:p>
+            <a:r>
+              <a:rPr lang="en-US" dirty="0"/>
+              <a:t>Why do you care?</a:t>
+            </a:r>
+          </a:p>
+        </p:txBody>
+      </p:sp>
+      <p:sp>
+        <p:nvSpPr>
+          <p:cNvPr id="3" name="Content Placeholder 2">
+            <a:extLst>
+              <a:ext uri="{FF2B5EF4-FFF2-40B4-BE49-F238E27FC236}">
+                <a16:creationId xmlns:a16="http://schemas.microsoft.com/office/drawing/2014/main" id="{C57C3E3C-A7FA-4B96-AF2E-4740DF287F18}"/>
+              </a:ext>
+            </a:extLst>
+          </p:cNvPr>
+          <p:cNvSpPr>
+            <a:spLocks noGrp="1"/>
+          </p:cNvSpPr>
+          <p:nvPr>
+            <p:ph idx="1"/>
+          </p:nvPr>
+        </p:nvSpPr>
+        <p:spPr/>
+        <p:txBody>
+          <a:bodyPr/>
+          <a:lstStyle/>
+          <a:p>
+            <a:r>
+              <a:rPr lang="en-US" dirty="0"/>
+              <a:t>Why we chose this topic</a:t>
+            </a:r>
+          </a:p>
+          <a:p>
+            <a:endParaRPr lang="en-US" dirty="0"/>
+          </a:p>
+          <a:p>
+            <a:r>
+              <a:rPr lang="en-US" dirty="0"/>
+              <a:t>We wanted to know if price is related to the outcome of a Health Inspection</a:t>
+            </a:r>
+          </a:p>
+          <a:p>
+            <a:pPr marL="0" indent="0">
+              <a:buNone/>
+            </a:pPr>
+            <a:endParaRPr lang="en-US" dirty="0"/>
+          </a:p>
+        </p:txBody>
+      </p:sp>
+    </p:spTree>
+    <p:extLst>
+      <p:ext uri="{BB962C8B-B14F-4D97-AF65-F5344CB8AC3E}">
+        <p14:creationId xmlns:p14="http://schemas.microsoft.com/office/powerpoint/2010/main" val="3771910647"/>
+      </p:ext>
+    </p:extLst>
+  </p:cSld>
+  <p:clrMapOvr>
+    <a:masterClrMapping/>
+  </p:clrMapOvr>
+</p:sld>
+</file>
+
+<file path=ppt/slides/slide20.xml><?xml version="1.0" encoding="utf-8"?>
 <p:sld xmlns:a="http://schemas.openxmlformats.org/drawingml/2006/main" xmlns:r="http://schemas.openxmlformats.org/officeDocument/2006/relationships" xmlns:p="http://schemas.openxmlformats.org/presentationml/2006/main">
   <p:cSld>
     <p:spTree>
@@ -6264,111 +6456,7 @@
 </p:sld>
 </file>
 
-<file path=ppt/slides/slide2.xml><?xml version="1.0" encoding="utf-8"?>
-<p:sld xmlns:a="http://schemas.openxmlformats.org/drawingml/2006/main" xmlns:r="http://schemas.openxmlformats.org/officeDocument/2006/relationships" xmlns:p="http://schemas.openxmlformats.org/presentationml/2006/main">
-  <p:cSld>
-    <p:spTree>
-      <p:nvGrpSpPr>
-        <p:cNvPr id="1" name=""/>
-        <p:cNvGrpSpPr/>
-        <p:nvPr/>
-      </p:nvGrpSpPr>
-      <p:grpSpPr>
-        <a:xfrm>
-          <a:off x="0" y="0"/>
-          <a:ext cx="0" cy="0"/>
-          <a:chOff x="0" y="0"/>
-          <a:chExt cx="0" cy="0"/>
-        </a:xfrm>
-      </p:grpSpPr>
-      <p:sp>
-        <p:nvSpPr>
-          <p:cNvPr id="2" name="Title 1">
-            <a:extLst>
-              <a:ext uri="{FF2B5EF4-FFF2-40B4-BE49-F238E27FC236}">
-                <a16:creationId xmlns:a16="http://schemas.microsoft.com/office/drawing/2014/main" id="{EC497F1B-C30B-4F56-A9B5-0A85B7C3C219}"/>
-              </a:ext>
-            </a:extLst>
-          </p:cNvPr>
-          <p:cNvSpPr>
-            <a:spLocks noGrp="1"/>
-          </p:cNvSpPr>
-          <p:nvPr>
-            <p:ph type="title"/>
-          </p:nvPr>
-        </p:nvSpPr>
-        <p:spPr/>
-        <p:txBody>
-          <a:bodyPr/>
-          <a:lstStyle/>
-          <a:p>
-            <a:r>
-              <a:rPr lang="en-US" dirty="0"/>
-              <a:t>Why do you care?</a:t>
-            </a:r>
-          </a:p>
-        </p:txBody>
-      </p:sp>
-      <p:sp>
-        <p:nvSpPr>
-          <p:cNvPr id="3" name="Content Placeholder 2">
-            <a:extLst>
-              <a:ext uri="{FF2B5EF4-FFF2-40B4-BE49-F238E27FC236}">
-                <a16:creationId xmlns:a16="http://schemas.microsoft.com/office/drawing/2014/main" id="{C57C3E3C-A7FA-4B96-AF2E-4740DF287F18}"/>
-              </a:ext>
-            </a:extLst>
-          </p:cNvPr>
-          <p:cNvSpPr>
-            <a:spLocks noGrp="1"/>
-          </p:cNvSpPr>
-          <p:nvPr>
-            <p:ph idx="1"/>
-          </p:nvPr>
-        </p:nvSpPr>
-        <p:spPr/>
-        <p:txBody>
-          <a:bodyPr/>
-          <a:lstStyle/>
-          <a:p>
-            <a:r>
-              <a:rPr lang="en-US" dirty="0"/>
-              <a:t>Why we chose this topic</a:t>
-            </a:r>
-          </a:p>
-          <a:p>
-            <a:endParaRPr lang="en-US" dirty="0"/>
-          </a:p>
-          <a:p>
-            <a:r>
-              <a:rPr lang="en-US" dirty="0"/>
-              <a:t>We wanted to know if price is related to the outcome of a Health Inspection</a:t>
-            </a:r>
-          </a:p>
-          <a:p>
-            <a:endParaRPr lang="en-US" dirty="0"/>
-          </a:p>
-          <a:p>
-            <a:r>
-              <a:rPr lang="en-US" dirty="0"/>
-              <a:t>Our hypothesis</a:t>
-            </a:r>
-          </a:p>
-        </p:txBody>
-      </p:sp>
-    </p:spTree>
-    <p:extLst>
-      <p:ext uri="{BB962C8B-B14F-4D97-AF65-F5344CB8AC3E}">
-        <p14:creationId xmlns:p14="http://schemas.microsoft.com/office/powerpoint/2010/main" val="3771910647"/>
-      </p:ext>
-    </p:extLst>
-  </p:cSld>
-  <p:clrMapOvr>
-    <a:masterClrMapping/>
-  </p:clrMapOvr>
-</p:sld>
-</file>
-
-<file path=ppt/slides/slide20.xml><?xml version="1.0" encoding="utf-8"?>
+<file path=ppt/slides/slide21.xml><?xml version="1.0" encoding="utf-8"?>
 <p:sld xmlns:a="http://schemas.openxmlformats.org/drawingml/2006/main" xmlns:r="http://schemas.openxmlformats.org/officeDocument/2006/relationships" xmlns:p="http://schemas.openxmlformats.org/presentationml/2006/main">
   <p:cSld>
     <p:spTree>
@@ -6430,121 +6518,6 @@
 </p:sld>
 </file>
 
-<file path=ppt/slides/slide21.xml><?xml version="1.0" encoding="utf-8"?>
-<p:sld xmlns:a="http://schemas.openxmlformats.org/drawingml/2006/main" xmlns:r="http://schemas.openxmlformats.org/officeDocument/2006/relationships" xmlns:p="http://schemas.openxmlformats.org/presentationml/2006/main">
-  <p:cSld>
-    <p:spTree>
-      <p:nvGrpSpPr>
-        <p:cNvPr id="1" name=""/>
-        <p:cNvGrpSpPr/>
-        <p:nvPr/>
-      </p:nvGrpSpPr>
-      <p:grpSpPr>
-        <a:xfrm>
-          <a:off x="0" y="0"/>
-          <a:ext cx="0" cy="0"/>
-          <a:chOff x="0" y="0"/>
-          <a:chExt cx="0" cy="0"/>
-        </a:xfrm>
-      </p:grpSpPr>
-      <p:sp>
-        <p:nvSpPr>
-          <p:cNvPr id="2" name="Title 1">
-            <a:extLst>
-              <a:ext uri="{FF2B5EF4-FFF2-40B4-BE49-F238E27FC236}">
-                <a16:creationId xmlns:a16="http://schemas.microsoft.com/office/drawing/2014/main" id="{D0B1C1E6-F0EC-495A-9CD4-93351601C446}"/>
-              </a:ext>
-            </a:extLst>
-          </p:cNvPr>
-          <p:cNvSpPr>
-            <a:spLocks noGrp="1"/>
-          </p:cNvSpPr>
-          <p:nvPr>
-            <p:ph type="title"/>
-          </p:nvPr>
-        </p:nvSpPr>
-        <p:spPr/>
-        <p:txBody>
-          <a:bodyPr/>
-          <a:lstStyle/>
-          <a:p>
-            <a:r>
-              <a:rPr lang="en-US" dirty="0"/>
-              <a:t>Why we are right if we are?</a:t>
-            </a:r>
-          </a:p>
-        </p:txBody>
-      </p:sp>
-      <p:sp>
-        <p:nvSpPr>
-          <p:cNvPr id="3" name="Content Placeholder 2">
-            <a:extLst>
-              <a:ext uri="{FF2B5EF4-FFF2-40B4-BE49-F238E27FC236}">
-                <a16:creationId xmlns:a16="http://schemas.microsoft.com/office/drawing/2014/main" id="{7C58205A-18BD-4DD1-926B-646A04B076EB}"/>
-              </a:ext>
-            </a:extLst>
-          </p:cNvPr>
-          <p:cNvSpPr>
-            <a:spLocks noGrp="1"/>
-          </p:cNvSpPr>
-          <p:nvPr>
-            <p:ph idx="1"/>
-          </p:nvPr>
-        </p:nvSpPr>
-        <p:spPr/>
-        <p:txBody>
-          <a:bodyPr>
-            <a:normAutofit fontScale="92500" lnSpcReduction="10000"/>
-          </a:bodyPr>
-          <a:lstStyle/>
-          <a:p>
-            <a:r>
-              <a:rPr lang="en-US" dirty="0"/>
-              <a:t>Our assumption was the more expensive a restaurant is the better the health score.</a:t>
-            </a:r>
-          </a:p>
-          <a:p>
-            <a:endParaRPr lang="en-US" dirty="0"/>
-          </a:p>
-          <a:p>
-            <a:r>
-              <a:rPr lang="en-US" dirty="0"/>
-              <a:t>What we found was 87 business with an Expensive rating scored 94% on a health inspection</a:t>
-            </a:r>
-          </a:p>
-          <a:p>
-            <a:endParaRPr lang="en-US" dirty="0"/>
-          </a:p>
-          <a:p>
-            <a:r>
-              <a:rPr lang="en-US" dirty="0"/>
-              <a:t>We found that 855business with cheap rating scored 95% on a health inspection</a:t>
-            </a:r>
-          </a:p>
-          <a:p>
-            <a:endParaRPr lang="en-US" dirty="0"/>
-          </a:p>
-          <a:p>
-            <a:r>
-              <a:rPr lang="en-US" dirty="0"/>
-              <a:t>We found that 1153 business with a Mid rating scored 94% on a health inspection </a:t>
-            </a:r>
-          </a:p>
-        </p:txBody>
-      </p:sp>
-    </p:spTree>
-    <p:extLst>
-      <p:ext uri="{BB962C8B-B14F-4D97-AF65-F5344CB8AC3E}">
-        <p14:creationId xmlns:p14="http://schemas.microsoft.com/office/powerpoint/2010/main" val="3958127287"/>
-      </p:ext>
-    </p:extLst>
-  </p:cSld>
-  <p:clrMapOvr>
-    <a:masterClrMapping/>
-  </p:clrMapOvr>
-</p:sld>
-</file>
-
 <file path=ppt/slides/slide22.xml><?xml version="1.0" encoding="utf-8"?>
 <p:sld xmlns:a="http://schemas.openxmlformats.org/drawingml/2006/main" xmlns:r="http://schemas.openxmlformats.org/officeDocument/2006/relationships" xmlns:p="http://schemas.openxmlformats.org/presentationml/2006/main">
   <p:cSld>
@@ -6567,7 +6540,7 @@
           <p:cNvPr id="2" name="Title 1">
             <a:extLst>
               <a:ext uri="{FF2B5EF4-FFF2-40B4-BE49-F238E27FC236}">
-                <a16:creationId xmlns:a16="http://schemas.microsoft.com/office/drawing/2014/main" id="{A2717ECB-5E16-4022-857C-6CEAE49538DD}"/>
+                <a16:creationId xmlns:a16="http://schemas.microsoft.com/office/drawing/2014/main" id="{D0B1C1E6-F0EC-495A-9CD4-93351601C446}"/>
               </a:ext>
             </a:extLst>
           </p:cNvPr>
@@ -6585,7 +6558,7 @@
           <a:p>
             <a:r>
               <a:rPr lang="en-US" dirty="0"/>
-              <a:t>Memories </a:t>
+              <a:t>Why we are right if we are?</a:t>
             </a:r>
           </a:p>
         </p:txBody>
@@ -6595,7 +6568,7 @@
           <p:cNvPr id="3" name="Content Placeholder 2">
             <a:extLst>
               <a:ext uri="{FF2B5EF4-FFF2-40B4-BE49-F238E27FC236}">
-                <a16:creationId xmlns:a16="http://schemas.microsoft.com/office/drawing/2014/main" id="{4C08FD03-AB9D-4B90-BDFF-D05313DD5511}"/>
+                <a16:creationId xmlns:a16="http://schemas.microsoft.com/office/drawing/2014/main" id="{7C58205A-18BD-4DD1-926B-646A04B076EB}"/>
               </a:ext>
             </a:extLst>
           </p:cNvPr>
@@ -6608,45 +6581,41 @@
         </p:nvSpPr>
         <p:spPr/>
         <p:txBody>
-          <a:bodyPr/>
+          <a:bodyPr>
+            <a:normAutofit fontScale="92500" lnSpcReduction="10000"/>
+          </a:bodyPr>
           <a:lstStyle/>
           <a:p>
             <a:r>
               <a:rPr lang="en-US" dirty="0"/>
-              <a:t>Things that well</a:t>
-            </a:r>
-          </a:p>
-          <a:p>
-            <a:pPr marL="457200" lvl="1" indent="0">
-              <a:buNone/>
-            </a:pPr>
+              <a:t>Our assumption was the more expensive a restaurant is the better the health score.</a:t>
+            </a:r>
+          </a:p>
+          <a:p>
             <a:endParaRPr lang="en-US" dirty="0"/>
           </a:p>
           <a:p>
-            <a:pPr marL="0" indent="0">
-              <a:buNone/>
-            </a:pPr>
+            <a:r>
+              <a:rPr lang="en-US" dirty="0"/>
+              <a:t>What we found was 87 business with an Expensive rating had an average scored of 94% on a health inspection</a:t>
+            </a:r>
+          </a:p>
+          <a:p>
             <a:endParaRPr lang="en-US" dirty="0"/>
           </a:p>
           <a:p>
             <a:r>
               <a:rPr lang="en-US" dirty="0"/>
-              <a:t>Things that happened </a:t>
+              <a:t>We found that 855 business with cheap rating had an average scored 95% on a health inspection</a:t>
             </a:r>
           </a:p>
           <a:p>
             <a:endParaRPr lang="en-US" dirty="0"/>
           </a:p>
           <a:p>
-            <a:pPr marL="0" indent="0">
-              <a:buNone/>
-            </a:pPr>
-            <a:endParaRPr lang="en-US" dirty="0"/>
-          </a:p>
-          <a:p>
             <a:r>
               <a:rPr lang="en-US" dirty="0"/>
-              <a:t>Things that became a pain</a:t>
+              <a:t>We found that 1153 business with a Mid rating had an average scored 94% on a health inspection </a:t>
             </a:r>
           </a:p>
         </p:txBody>
@@ -6654,7 +6623,7 @@
     </p:spTree>
     <p:extLst>
       <p:ext uri="{BB962C8B-B14F-4D97-AF65-F5344CB8AC3E}">
-        <p14:creationId xmlns:p14="http://schemas.microsoft.com/office/powerpoint/2010/main" val="422892717"/>
+        <p14:creationId xmlns:p14="http://schemas.microsoft.com/office/powerpoint/2010/main" val="3958127287"/>
       </p:ext>
     </p:extLst>
   </p:cSld>
@@ -6686,7 +6655,7 @@
           <p:cNvPr id="2" name="Title 1">
             <a:extLst>
               <a:ext uri="{FF2B5EF4-FFF2-40B4-BE49-F238E27FC236}">
-                <a16:creationId xmlns:a16="http://schemas.microsoft.com/office/drawing/2014/main" id="{D10D6126-F040-4F9D-84C9-7C668D0CF058}"/>
+                <a16:creationId xmlns:a16="http://schemas.microsoft.com/office/drawing/2014/main" id="{A2717ECB-5E16-4022-857C-6CEAE49538DD}"/>
               </a:ext>
             </a:extLst>
           </p:cNvPr>
@@ -6704,7 +6673,7 @@
           <a:p>
             <a:r>
               <a:rPr lang="en-US" dirty="0"/>
-              <a:t>What do we wish we could have looked at</a:t>
+              <a:t>Memories </a:t>
             </a:r>
           </a:p>
         </p:txBody>
@@ -6714,7 +6683,7 @@
           <p:cNvPr id="3" name="Content Placeholder 2">
             <a:extLst>
               <a:ext uri="{FF2B5EF4-FFF2-40B4-BE49-F238E27FC236}">
-                <a16:creationId xmlns:a16="http://schemas.microsoft.com/office/drawing/2014/main" id="{4AF771E1-3D21-4B7C-8DD3-7356F754AB70}"/>
+                <a16:creationId xmlns:a16="http://schemas.microsoft.com/office/drawing/2014/main" id="{4C08FD03-AB9D-4B90-BDFF-D05313DD5511}"/>
               </a:ext>
             </a:extLst>
           </p:cNvPr>
@@ -6729,6 +6698,12 @@
         <p:txBody>
           <a:bodyPr/>
           <a:lstStyle/>
+          <a:p>
+            <a:r>
+              <a:rPr lang="en-US" dirty="0"/>
+              <a:t>Things that well</a:t>
+            </a:r>
+          </a:p>
           <a:p>
             <a:pPr marL="457200" lvl="1" indent="0">
               <a:buNone/>
@@ -6736,24 +6711,38 @@
             <a:endParaRPr lang="en-US" dirty="0"/>
           </a:p>
           <a:p>
-            <a:pPr lvl="1"/>
-            <a:r>
-              <a:rPr lang="en-US" dirty="0"/>
-              <a:t>More data</a:t>
-            </a:r>
-          </a:p>
-          <a:p>
             <a:pPr marL="0" indent="0">
               <a:buNone/>
             </a:pPr>
             <a:endParaRPr lang="en-US" dirty="0"/>
           </a:p>
+          <a:p>
+            <a:r>
+              <a:rPr lang="en-US" dirty="0"/>
+              <a:t>Things that happened </a:t>
+            </a:r>
+          </a:p>
+          <a:p>
+            <a:endParaRPr lang="en-US" dirty="0"/>
+          </a:p>
+          <a:p>
+            <a:pPr marL="0" indent="0">
+              <a:buNone/>
+            </a:pPr>
+            <a:endParaRPr lang="en-US" dirty="0"/>
+          </a:p>
+          <a:p>
+            <a:r>
+              <a:rPr lang="en-US" dirty="0"/>
+              <a:t>Things that became a pain</a:t>
+            </a:r>
+          </a:p>
         </p:txBody>
       </p:sp>
     </p:spTree>
     <p:extLst>
       <p:ext uri="{BB962C8B-B14F-4D97-AF65-F5344CB8AC3E}">
-        <p14:creationId xmlns:p14="http://schemas.microsoft.com/office/powerpoint/2010/main" val="3392035681"/>
+        <p14:creationId xmlns:p14="http://schemas.microsoft.com/office/powerpoint/2010/main" val="422892717"/>
       </p:ext>
     </p:extLst>
   </p:cSld>
@@ -6785,6 +6774,105 @@
           <p:cNvPr id="2" name="Title 1">
             <a:extLst>
               <a:ext uri="{FF2B5EF4-FFF2-40B4-BE49-F238E27FC236}">
+                <a16:creationId xmlns:a16="http://schemas.microsoft.com/office/drawing/2014/main" id="{D10D6126-F040-4F9D-84C9-7C668D0CF058}"/>
+              </a:ext>
+            </a:extLst>
+          </p:cNvPr>
+          <p:cNvSpPr>
+            <a:spLocks noGrp="1"/>
+          </p:cNvSpPr>
+          <p:nvPr>
+            <p:ph type="title"/>
+          </p:nvPr>
+        </p:nvSpPr>
+        <p:spPr/>
+        <p:txBody>
+          <a:bodyPr/>
+          <a:lstStyle/>
+          <a:p>
+            <a:r>
+              <a:rPr lang="en-US" dirty="0"/>
+              <a:t>What do we wish we could have looked at</a:t>
+            </a:r>
+          </a:p>
+        </p:txBody>
+      </p:sp>
+      <p:sp>
+        <p:nvSpPr>
+          <p:cNvPr id="3" name="Content Placeholder 2">
+            <a:extLst>
+              <a:ext uri="{FF2B5EF4-FFF2-40B4-BE49-F238E27FC236}">
+                <a16:creationId xmlns:a16="http://schemas.microsoft.com/office/drawing/2014/main" id="{4AF771E1-3D21-4B7C-8DD3-7356F754AB70}"/>
+              </a:ext>
+            </a:extLst>
+          </p:cNvPr>
+          <p:cNvSpPr>
+            <a:spLocks noGrp="1"/>
+          </p:cNvSpPr>
+          <p:nvPr>
+            <p:ph idx="1"/>
+          </p:nvPr>
+        </p:nvSpPr>
+        <p:spPr/>
+        <p:txBody>
+          <a:bodyPr/>
+          <a:lstStyle/>
+          <a:p>
+            <a:pPr marL="457200" lvl="1" indent="0">
+              <a:buNone/>
+            </a:pPr>
+            <a:endParaRPr lang="en-US" dirty="0"/>
+          </a:p>
+          <a:p>
+            <a:pPr lvl="1"/>
+            <a:r>
+              <a:rPr lang="en-US" dirty="0"/>
+              <a:t>More data</a:t>
+            </a:r>
+          </a:p>
+          <a:p>
+            <a:pPr marL="0" indent="0">
+              <a:buNone/>
+            </a:pPr>
+            <a:endParaRPr lang="en-US" dirty="0"/>
+          </a:p>
+        </p:txBody>
+      </p:sp>
+    </p:spTree>
+    <p:extLst>
+      <p:ext uri="{BB962C8B-B14F-4D97-AF65-F5344CB8AC3E}">
+        <p14:creationId xmlns:p14="http://schemas.microsoft.com/office/powerpoint/2010/main" val="3392035681"/>
+      </p:ext>
+    </p:extLst>
+  </p:cSld>
+  <p:clrMapOvr>
+    <a:masterClrMapping/>
+  </p:clrMapOvr>
+</p:sld>
+</file>
+
+<file path=ppt/slides/slide25.xml><?xml version="1.0" encoding="utf-8"?>
+<p:sld xmlns:a="http://schemas.openxmlformats.org/drawingml/2006/main" xmlns:r="http://schemas.openxmlformats.org/officeDocument/2006/relationships" xmlns:p="http://schemas.openxmlformats.org/presentationml/2006/main">
+  <p:cSld>
+    <p:spTree>
+      <p:nvGrpSpPr>
+        <p:cNvPr id="1" name=""/>
+        <p:cNvGrpSpPr/>
+        <p:nvPr/>
+      </p:nvGrpSpPr>
+      <p:grpSpPr>
+        <a:xfrm>
+          <a:off x="0" y="0"/>
+          <a:ext cx="0" cy="0"/>
+          <a:chOff x="0" y="0"/>
+          <a:chExt cx="0" cy="0"/>
+        </a:xfrm>
+      </p:grpSpPr>
+      <p:sp>
+        <p:nvSpPr>
+          <p:cNvPr id="2" name="Title 1">
+            <a:extLst>
+              <a:ext uri="{FF2B5EF4-FFF2-40B4-BE49-F238E27FC236}">
                 <a16:creationId xmlns:a16="http://schemas.microsoft.com/office/drawing/2014/main" id="{33FEAD5E-F809-49AA-B574-EA32265AACC7}"/>
               </a:ext>
             </a:extLst>
@@ -6883,7 +6971,7 @@
 </p:sld>
 </file>
 
-<file path=ppt/slides/slide25.xml><?xml version="1.0" encoding="utf-8"?>
+<file path=ppt/slides/slide26.xml><?xml version="1.0" encoding="utf-8"?>
 <p:sld xmlns:a="http://schemas.openxmlformats.org/drawingml/2006/main" xmlns:r="http://schemas.openxmlformats.org/officeDocument/2006/relationships" xmlns:p="http://schemas.openxmlformats.org/presentationml/2006/main">
   <p:cSld>
     <p:spTree>
@@ -7009,6 +7097,111 @@
           <p:cNvPr id="2" name="Title 1">
             <a:extLst>
               <a:ext uri="{FF2B5EF4-FFF2-40B4-BE49-F238E27FC236}">
+                <a16:creationId xmlns:a16="http://schemas.microsoft.com/office/drawing/2014/main" id="{64DE8718-DF5F-48C4-AC67-3A29A062C004}"/>
+              </a:ext>
+            </a:extLst>
+          </p:cNvPr>
+          <p:cNvSpPr>
+            <a:spLocks noGrp="1"/>
+          </p:cNvSpPr>
+          <p:nvPr>
+            <p:ph type="title"/>
+          </p:nvPr>
+        </p:nvSpPr>
+        <p:spPr/>
+        <p:txBody>
+          <a:bodyPr>
+            <a:normAutofit/>
+          </a:bodyPr>
+          <a:lstStyle/>
+          <a:p>
+            <a:r>
+              <a:rPr lang="en-US" sz="6000" dirty="0"/>
+              <a:t>Our Hypothesis </a:t>
+            </a:r>
+          </a:p>
+        </p:txBody>
+      </p:sp>
+      <p:sp>
+        <p:nvSpPr>
+          <p:cNvPr id="3" name="Content Placeholder 2">
+            <a:extLst>
+              <a:ext uri="{FF2B5EF4-FFF2-40B4-BE49-F238E27FC236}">
+                <a16:creationId xmlns:a16="http://schemas.microsoft.com/office/drawing/2014/main" id="{3B89F5C4-6D6E-4668-916F-81447166D3CF}"/>
+              </a:ext>
+            </a:extLst>
+          </p:cNvPr>
+          <p:cNvSpPr>
+            <a:spLocks noGrp="1"/>
+          </p:cNvSpPr>
+          <p:nvPr>
+            <p:ph idx="1"/>
+          </p:nvPr>
+        </p:nvSpPr>
+        <p:spPr/>
+        <p:txBody>
+          <a:bodyPr>
+            <a:normAutofit/>
+          </a:bodyPr>
+          <a:lstStyle/>
+          <a:p>
+            <a:pPr marL="0" indent="0">
+              <a:buNone/>
+            </a:pPr>
+            <a:endParaRPr lang="en-US" sz="3600" dirty="0"/>
+          </a:p>
+          <a:p>
+            <a:pPr marL="0" indent="0">
+              <a:buNone/>
+            </a:pPr>
+            <a:endParaRPr lang="en-US" sz="3600" dirty="0"/>
+          </a:p>
+          <a:p>
+            <a:pPr marL="0" indent="0">
+              <a:buNone/>
+            </a:pPr>
+            <a:r>
+              <a:rPr lang="en-US" sz="3600" dirty="0"/>
+              <a:t>Restaurants that are more expensive have higher health inspection scores.</a:t>
+            </a:r>
+          </a:p>
+        </p:txBody>
+      </p:sp>
+    </p:spTree>
+    <p:extLst>
+      <p:ext uri="{BB962C8B-B14F-4D97-AF65-F5344CB8AC3E}">
+        <p14:creationId xmlns:p14="http://schemas.microsoft.com/office/powerpoint/2010/main" val="3594637698"/>
+      </p:ext>
+    </p:extLst>
+  </p:cSld>
+  <p:clrMapOvr>
+    <a:masterClrMapping/>
+  </p:clrMapOvr>
+</p:sld>
+</file>
+
+<file path=ppt/slides/slide4.xml><?xml version="1.0" encoding="utf-8"?>
+<p:sld xmlns:a="http://schemas.openxmlformats.org/drawingml/2006/main" xmlns:r="http://schemas.openxmlformats.org/officeDocument/2006/relationships" xmlns:p="http://schemas.openxmlformats.org/presentationml/2006/main">
+  <p:cSld>
+    <p:spTree>
+      <p:nvGrpSpPr>
+        <p:cNvPr id="1" name=""/>
+        <p:cNvGrpSpPr/>
+        <p:nvPr/>
+      </p:nvGrpSpPr>
+      <p:grpSpPr>
+        <a:xfrm>
+          <a:off x="0" y="0"/>
+          <a:ext cx="0" cy="0"/>
+          <a:chOff x="0" y="0"/>
+          <a:chExt cx="0" cy="0"/>
+        </a:xfrm>
+      </p:grpSpPr>
+      <p:sp>
+        <p:nvSpPr>
+          <p:cNvPr id="2" name="Title 1">
+            <a:extLst>
+              <a:ext uri="{FF2B5EF4-FFF2-40B4-BE49-F238E27FC236}">
                 <a16:creationId xmlns:a16="http://schemas.microsoft.com/office/drawing/2014/main" id="{7D36FF52-D128-4824-9D45-17EF5E6F34EE}"/>
               </a:ext>
             </a:extLst>
@@ -7150,7 +7343,7 @@
 </p:sld>
 </file>
 
-<file path=ppt/slides/slide4.xml><?xml version="1.0" encoding="utf-8"?>
+<file path=ppt/slides/slide5.xml><?xml version="1.0" encoding="utf-8"?>
 <p:sld xmlns:a="http://schemas.openxmlformats.org/drawingml/2006/main" xmlns:r="http://schemas.openxmlformats.org/officeDocument/2006/relationships" xmlns:p="http://schemas.openxmlformats.org/presentationml/2006/main">
   <p:cSld>
     <p:spTree>
@@ -7272,7 +7465,7 @@
 </p:sld>
 </file>
 
-<file path=ppt/slides/slide5.xml><?xml version="1.0" encoding="utf-8"?>
+<file path=ppt/slides/slide6.xml><?xml version="1.0" encoding="utf-8"?>
 <p:sld xmlns:a="http://schemas.openxmlformats.org/drawingml/2006/main" xmlns:r="http://schemas.openxmlformats.org/officeDocument/2006/relationships" xmlns:p="http://schemas.openxmlformats.org/presentationml/2006/main">
   <p:cSld>
     <p:spTree>
@@ -7362,7 +7555,7 @@
 </p:sld>
 </file>
 
-<file path=ppt/slides/slide6.xml><?xml version="1.0" encoding="utf-8"?>
+<file path=ppt/slides/slide7.xml><?xml version="1.0" encoding="utf-8"?>
 <p:sld xmlns:a="http://schemas.openxmlformats.org/drawingml/2006/main" xmlns:r="http://schemas.openxmlformats.org/officeDocument/2006/relationships" xmlns:p="http://schemas.openxmlformats.org/presentationml/2006/main">
   <p:cSld>
     <p:spTree>
@@ -7482,7 +7675,7 @@
 </p:sld>
 </file>
 
-<file path=ppt/slides/slide7.xml><?xml version="1.0" encoding="utf-8"?>
+<file path=ppt/slides/slide8.xml><?xml version="1.0" encoding="utf-8"?>
 <p:sld xmlns:a="http://schemas.openxmlformats.org/drawingml/2006/main" xmlns:r="http://schemas.openxmlformats.org/officeDocument/2006/relationships" xmlns:p="http://schemas.openxmlformats.org/presentationml/2006/main">
   <p:cSld>
     <p:spTree>
@@ -7572,7 +7765,7 @@
 </p:sld>
 </file>
 
-<file path=ppt/slides/slide8.xml><?xml version="1.0" encoding="utf-8"?>
+<file path=ppt/slides/slide9.xml><?xml version="1.0" encoding="utf-8"?>
 <p:sld xmlns:a="http://schemas.openxmlformats.org/drawingml/2006/main" xmlns:r="http://schemas.openxmlformats.org/officeDocument/2006/relationships" xmlns:p="http://schemas.openxmlformats.org/presentationml/2006/main">
   <p:cSld>
     <p:spTree>
@@ -7695,96 +7888,6 @@
     <p:extLst>
       <p:ext uri="{BB962C8B-B14F-4D97-AF65-F5344CB8AC3E}">
         <p14:creationId xmlns:p14="http://schemas.microsoft.com/office/powerpoint/2010/main" val="3180740736"/>
-      </p:ext>
-    </p:extLst>
-  </p:cSld>
-  <p:clrMapOvr>
-    <a:masterClrMapping/>
-  </p:clrMapOvr>
-</p:sld>
-</file>
-
-<file path=ppt/slides/slide9.xml><?xml version="1.0" encoding="utf-8"?>
-<p:sld xmlns:a="http://schemas.openxmlformats.org/drawingml/2006/main" xmlns:r="http://schemas.openxmlformats.org/officeDocument/2006/relationships" xmlns:p="http://schemas.openxmlformats.org/presentationml/2006/main">
-  <p:cSld>
-    <p:spTree>
-      <p:nvGrpSpPr>
-        <p:cNvPr id="1" name=""/>
-        <p:cNvGrpSpPr/>
-        <p:nvPr/>
-      </p:nvGrpSpPr>
-      <p:grpSpPr>
-        <a:xfrm>
-          <a:off x="0" y="0"/>
-          <a:ext cx="0" cy="0"/>
-          <a:chOff x="0" y="0"/>
-          <a:chExt cx="0" cy="0"/>
-        </a:xfrm>
-      </p:grpSpPr>
-      <p:sp>
-        <p:nvSpPr>
-          <p:cNvPr id="2" name="Title 1">
-            <a:extLst>
-              <a:ext uri="{FF2B5EF4-FFF2-40B4-BE49-F238E27FC236}">
-                <a16:creationId xmlns:a16="http://schemas.microsoft.com/office/drawing/2014/main" id="{955499BD-B941-4183-A602-AA8DF9B9C0FB}"/>
-              </a:ext>
-            </a:extLst>
-          </p:cNvPr>
-          <p:cNvSpPr>
-            <a:spLocks noGrp="1"/>
-          </p:cNvSpPr>
-          <p:nvPr>
-            <p:ph type="title"/>
-          </p:nvPr>
-        </p:nvSpPr>
-        <p:spPr/>
-        <p:txBody>
-          <a:bodyPr/>
-          <a:lstStyle/>
-          <a:p>
-            <a:r>
-              <a:rPr lang="en-US" dirty="0"/>
-              <a:t>We added some data to columns</a:t>
-            </a:r>
-          </a:p>
-        </p:txBody>
-      </p:sp>
-      <p:pic>
-        <p:nvPicPr>
-          <p:cNvPr id="5" name="Content Placeholder 4">
-            <a:extLst>
-              <a:ext uri="{FF2B5EF4-FFF2-40B4-BE49-F238E27FC236}">
-                <a16:creationId xmlns:a16="http://schemas.microsoft.com/office/drawing/2014/main" id="{EA29BE49-D903-45B5-97DE-91888A47A525}"/>
-              </a:ext>
-            </a:extLst>
-          </p:cNvPr>
-          <p:cNvPicPr>
-            <a:picLocks noGrp="1" noChangeAspect="1"/>
-          </p:cNvPicPr>
-          <p:nvPr>
-            <p:ph idx="1"/>
-          </p:nvPr>
-        </p:nvPicPr>
-        <p:blipFill>
-          <a:blip r:embed="rId2"/>
-          <a:stretch>
-            <a:fillRect/>
-          </a:stretch>
-        </p:blipFill>
-        <p:spPr>
-          <a:xfrm>
-            <a:off x="1425251" y="1625374"/>
-            <a:ext cx="9341498" cy="5053122"/>
-          </a:xfrm>
-          <a:prstGeom prst="rect">
-            <a:avLst/>
-          </a:prstGeom>
-        </p:spPr>
-      </p:pic>
-    </p:spTree>
-    <p:extLst>
-      <p:ext uri="{BB962C8B-B14F-4D97-AF65-F5344CB8AC3E}">
-        <p14:creationId xmlns:p14="http://schemas.microsoft.com/office/powerpoint/2010/main" val="1933645533"/>
       </p:ext>
     </p:extLst>
   </p:cSld>

</xml_diff>